<commit_message>
Save and push latest versions
</commit_message>
<xml_diff>
--- a/Documents/GraphTheoryPresentation.pptx
+++ b/Documents/GraphTheoryPresentation.pptx
@@ -11,6 +11,13 @@
     <p:sldId id="259" r:id="rId5"/>
     <p:sldId id="260" r:id="rId6"/>
     <p:sldId id="261" r:id="rId7"/>
+    <p:sldId id="263" r:id="rId8"/>
+    <p:sldId id="264" r:id="rId9"/>
+    <p:sldId id="268" r:id="rId10"/>
+    <p:sldId id="265" r:id="rId11"/>
+    <p:sldId id="266" r:id="rId12"/>
+    <p:sldId id="267" r:id="rId13"/>
+    <p:sldId id="262" r:id="rId14"/>
   </p:sldIdLst>
   <p:sldSz cx="12192000" cy="6858000"/>
   <p:notesSz cx="6858000" cy="9144000"/>
@@ -109,6 +116,11 @@
       </a:defRPr>
     </a:lvl9pPr>
   </p:defaultTextStyle>
+  <p:extLst>
+    <p:ext uri="{EFAFB233-063F-42B5-8137-9DF3F51BA10A}">
+      <p15:sldGuideLst xmlns:p15="http://schemas.microsoft.com/office/powerpoint/2012/main"/>
+    </p:ext>
+  </p:extLst>
 </p:presentation>
 </file>
 
@@ -295,7 +307,7 @@
           <a:p>
             <a:fld id="{3193134D-0F55-4C59-9C29-9CE94E03BA7C}" type="datetimeFigureOut">
               <a:rPr lang="en-US" smtClean="0"/>
-              <a:t>4/5/2016</a:t>
+              <a:t>4/13/2016</a:t>
             </a:fld>
             <a:endParaRPr lang="en-US"/>
           </a:p>
@@ -570,7 +582,7 @@
           <a:p>
             <a:fld id="{3193134D-0F55-4C59-9C29-9CE94E03BA7C}" type="datetimeFigureOut">
               <a:rPr lang="en-US" smtClean="0"/>
-              <a:t>4/5/2016</a:t>
+              <a:t>4/13/2016</a:t>
             </a:fld>
             <a:endParaRPr lang="en-US"/>
           </a:p>
@@ -764,7 +776,7 @@
           <a:p>
             <a:fld id="{3193134D-0F55-4C59-9C29-9CE94E03BA7C}" type="datetimeFigureOut">
               <a:rPr lang="en-US" smtClean="0"/>
-              <a:t>4/5/2016</a:t>
+              <a:t>4/13/2016</a:t>
             </a:fld>
             <a:endParaRPr lang="en-US"/>
           </a:p>
@@ -1032,7 +1044,7 @@
           <a:p>
             <a:fld id="{3193134D-0F55-4C59-9C29-9CE94E03BA7C}" type="datetimeFigureOut">
               <a:rPr lang="en-US" smtClean="0"/>
-              <a:t>4/5/2016</a:t>
+              <a:t>4/13/2016</a:t>
             </a:fld>
             <a:endParaRPr lang="en-US"/>
           </a:p>
@@ -1364,7 +1376,7 @@
           <a:p>
             <a:fld id="{3193134D-0F55-4C59-9C29-9CE94E03BA7C}" type="datetimeFigureOut">
               <a:rPr lang="en-US" smtClean="0"/>
-              <a:t>4/5/2016</a:t>
+              <a:t>4/13/2016</a:t>
             </a:fld>
             <a:endParaRPr lang="en-US"/>
           </a:p>
@@ -1974,7 +1986,7 @@
           <a:p>
             <a:fld id="{3193134D-0F55-4C59-9C29-9CE94E03BA7C}" type="datetimeFigureOut">
               <a:rPr lang="en-US" smtClean="0"/>
-              <a:t>4/5/2016</a:t>
+              <a:t>4/13/2016</a:t>
             </a:fld>
             <a:endParaRPr lang="en-US"/>
           </a:p>
@@ -2821,7 +2833,7 @@
           <a:p>
             <a:fld id="{3193134D-0F55-4C59-9C29-9CE94E03BA7C}" type="datetimeFigureOut">
               <a:rPr lang="en-US" smtClean="0"/>
-              <a:t>4/5/2016</a:t>
+              <a:t>4/13/2016</a:t>
             </a:fld>
             <a:endParaRPr lang="en-US"/>
           </a:p>
@@ -2991,7 +3003,7 @@
           <a:p>
             <a:fld id="{3193134D-0F55-4C59-9C29-9CE94E03BA7C}" type="datetimeFigureOut">
               <a:rPr lang="en-US" smtClean="0"/>
-              <a:t>4/5/2016</a:t>
+              <a:t>4/13/2016</a:t>
             </a:fld>
             <a:endParaRPr lang="en-US"/>
           </a:p>
@@ -3171,7 +3183,7 @@
           <a:p>
             <a:fld id="{3193134D-0F55-4C59-9C29-9CE94E03BA7C}" type="datetimeFigureOut">
               <a:rPr lang="en-US" smtClean="0"/>
-              <a:t>4/5/2016</a:t>
+              <a:t>4/13/2016</a:t>
             </a:fld>
             <a:endParaRPr lang="en-US"/>
           </a:p>
@@ -3341,7 +3353,7 @@
           <a:p>
             <a:fld id="{3193134D-0F55-4C59-9C29-9CE94E03BA7C}" type="datetimeFigureOut">
               <a:rPr lang="en-US" smtClean="0"/>
-              <a:t>4/5/2016</a:t>
+              <a:t>4/13/2016</a:t>
             </a:fld>
             <a:endParaRPr lang="en-US"/>
           </a:p>
@@ -3585,7 +3597,7 @@
           <a:p>
             <a:fld id="{3193134D-0F55-4C59-9C29-9CE94E03BA7C}" type="datetimeFigureOut">
               <a:rPr lang="en-US" smtClean="0"/>
-              <a:t>4/5/2016</a:t>
+              <a:t>4/13/2016</a:t>
             </a:fld>
             <a:endParaRPr lang="en-US"/>
           </a:p>
@@ -3877,7 +3889,7 @@
           <a:p>
             <a:fld id="{3193134D-0F55-4C59-9C29-9CE94E03BA7C}" type="datetimeFigureOut">
               <a:rPr lang="en-US" smtClean="0"/>
-              <a:t>4/5/2016</a:t>
+              <a:t>4/13/2016</a:t>
             </a:fld>
             <a:endParaRPr lang="en-US"/>
           </a:p>
@@ -4315,7 +4327,7 @@
           <a:p>
             <a:fld id="{3193134D-0F55-4C59-9C29-9CE94E03BA7C}" type="datetimeFigureOut">
               <a:rPr lang="en-US" smtClean="0"/>
-              <a:t>4/5/2016</a:t>
+              <a:t>4/13/2016</a:t>
             </a:fld>
             <a:endParaRPr lang="en-US"/>
           </a:p>
@@ -4433,7 +4445,7 @@
           <a:p>
             <a:fld id="{3193134D-0F55-4C59-9C29-9CE94E03BA7C}" type="datetimeFigureOut">
               <a:rPr lang="en-US" smtClean="0"/>
-              <a:t>4/5/2016</a:t>
+              <a:t>4/13/2016</a:t>
             </a:fld>
             <a:endParaRPr lang="en-US"/>
           </a:p>
@@ -4528,7 +4540,7 @@
           <a:p>
             <a:fld id="{3193134D-0F55-4C59-9C29-9CE94E03BA7C}" type="datetimeFigureOut">
               <a:rPr lang="en-US" smtClean="0"/>
-              <a:t>4/5/2016</a:t>
+              <a:t>4/13/2016</a:t>
             </a:fld>
             <a:endParaRPr lang="en-US"/>
           </a:p>
@@ -4807,7 +4819,7 @@
           <a:p>
             <a:fld id="{3193134D-0F55-4C59-9C29-9CE94E03BA7C}" type="datetimeFigureOut">
               <a:rPr lang="en-US" smtClean="0"/>
-              <a:t>4/5/2016</a:t>
+              <a:t>4/13/2016</a:t>
             </a:fld>
             <a:endParaRPr lang="en-US"/>
           </a:p>
@@ -5082,7 +5094,7 @@
           <a:p>
             <a:fld id="{3193134D-0F55-4C59-9C29-9CE94E03BA7C}" type="datetimeFigureOut">
               <a:rPr lang="en-US" smtClean="0"/>
-              <a:t>4/5/2016</a:t>
+              <a:t>4/13/2016</a:t>
             </a:fld>
             <a:endParaRPr lang="en-US"/>
           </a:p>
@@ -5511,7 +5523,7 @@
           <a:p>
             <a:fld id="{3193134D-0F55-4C59-9C29-9CE94E03BA7C}" type="datetimeFigureOut">
               <a:rPr lang="en-US" smtClean="0"/>
-              <a:t>4/5/2016</a:t>
+              <a:t>4/13/2016</a:t>
             </a:fld>
             <a:endParaRPr lang="en-US"/>
           </a:p>
@@ -6030,13 +6042,13 @@
         </p:spPr>
         <p:txBody>
           <a:bodyPr>
-            <a:normAutofit fontScale="90000"/>
+            <a:normAutofit/>
           </a:bodyPr>
           <a:lstStyle/>
           <a:p>
             <a:r>
               <a:rPr lang="en-US" sz="4800" dirty="0" smtClean="0"/>
-              <a:t>Real world example of Dijkstra’s pathfinding Algorithm vs a popular pathfinding heuristic</a:t>
+              <a:t>Dijkstra’s pathfinding Algorithm vs a popular pathfinding heuristic</a:t>
             </a:r>
             <a:endParaRPr lang="en-US" sz="4800" dirty="0"/>
           </a:p>
@@ -6046,6 +6058,444 @@
     <p:extLst>
       <p:ext uri="{BB962C8B-B14F-4D97-AF65-F5344CB8AC3E}">
         <p14:creationId xmlns:p14="http://schemas.microsoft.com/office/powerpoint/2010/main" val="2259533018"/>
+      </p:ext>
+    </p:extLst>
+  </p:cSld>
+  <p:clrMapOvr>
+    <a:masterClrMapping/>
+  </p:clrMapOvr>
+  <p:timing>
+    <p:tnLst>
+      <p:par>
+        <p:cTn id="1" dur="indefinite" restart="never" nodeType="tmRoot"/>
+      </p:par>
+    </p:tnLst>
+  </p:timing>
+</p:sld>
+</file>
+
+<file path=ppt/slides/slide10.xml><?xml version="1.0" encoding="utf-8"?>
+<p:sld xmlns:a="http://schemas.openxmlformats.org/drawingml/2006/main" xmlns:r="http://schemas.openxmlformats.org/officeDocument/2006/relationships" xmlns:p="http://schemas.openxmlformats.org/presentationml/2006/main">
+  <p:cSld>
+    <p:spTree>
+      <p:nvGrpSpPr>
+        <p:cNvPr id="1" name=""/>
+        <p:cNvGrpSpPr/>
+        <p:nvPr/>
+      </p:nvGrpSpPr>
+      <p:grpSpPr>
+        <a:xfrm>
+          <a:off x="0" y="0"/>
+          <a:ext cx="0" cy="0"/>
+          <a:chOff x="0" y="0"/>
+          <a:chExt cx="0" cy="0"/>
+        </a:xfrm>
+      </p:grpSpPr>
+      <p:sp>
+        <p:nvSpPr>
+          <p:cNvPr id="2" name="Title 1"/>
+          <p:cNvSpPr>
+            <a:spLocks noGrp="1"/>
+          </p:cNvSpPr>
+          <p:nvPr>
+            <p:ph type="title"/>
+          </p:nvPr>
+        </p:nvSpPr>
+        <p:spPr/>
+        <p:txBody>
+          <a:bodyPr/>
+          <a:lstStyle/>
+          <a:p>
+            <a:endParaRPr lang="en-US"/>
+          </a:p>
+        </p:txBody>
+      </p:sp>
+      <p:pic>
+        <p:nvPicPr>
+          <p:cNvPr id="6" name="Content Placeholder 5"/>
+          <p:cNvPicPr>
+            <a:picLocks noGrp="1" noChangeAspect="1"/>
+          </p:cNvPicPr>
+          <p:nvPr>
+            <p:ph idx="1"/>
+          </p:nvPr>
+        </p:nvPicPr>
+        <p:blipFill>
+          <a:blip r:embed="rId2">
+            <a:extLst>
+              <a:ext uri="{28A0092B-C50C-407E-A947-70E740481C1C}">
+                <a14:useLocalDpi xmlns:a14="http://schemas.microsoft.com/office/drawing/2010/main" val="0"/>
+              </a:ext>
+            </a:extLst>
+          </a:blip>
+          <a:stretch>
+            <a:fillRect/>
+          </a:stretch>
+        </p:blipFill>
+        <p:spPr>
+          <a:xfrm>
+            <a:off x="260892" y="201803"/>
+            <a:ext cx="11593257" cy="6521207"/>
+          </a:xfrm>
+        </p:spPr>
+      </p:pic>
+    </p:spTree>
+    <p:extLst>
+      <p:ext uri="{BB962C8B-B14F-4D97-AF65-F5344CB8AC3E}">
+        <p14:creationId xmlns:p14="http://schemas.microsoft.com/office/powerpoint/2010/main" val="3662948277"/>
+      </p:ext>
+    </p:extLst>
+  </p:cSld>
+  <p:clrMapOvr>
+    <a:masterClrMapping/>
+  </p:clrMapOvr>
+  <p:timing>
+    <p:tnLst>
+      <p:par>
+        <p:cTn id="1" dur="indefinite" restart="never" nodeType="tmRoot"/>
+      </p:par>
+    </p:tnLst>
+  </p:timing>
+</p:sld>
+</file>
+
+<file path=ppt/slides/slide11.xml><?xml version="1.0" encoding="utf-8"?>
+<p:sld xmlns:a="http://schemas.openxmlformats.org/drawingml/2006/main" xmlns:r="http://schemas.openxmlformats.org/officeDocument/2006/relationships" xmlns:p="http://schemas.openxmlformats.org/presentationml/2006/main">
+  <p:cSld>
+    <p:spTree>
+      <p:nvGrpSpPr>
+        <p:cNvPr id="1" name=""/>
+        <p:cNvGrpSpPr/>
+        <p:nvPr/>
+      </p:nvGrpSpPr>
+      <p:grpSpPr>
+        <a:xfrm>
+          <a:off x="0" y="0"/>
+          <a:ext cx="0" cy="0"/>
+          <a:chOff x="0" y="0"/>
+          <a:chExt cx="0" cy="0"/>
+        </a:xfrm>
+      </p:grpSpPr>
+      <p:sp>
+        <p:nvSpPr>
+          <p:cNvPr id="2" name="Title 1"/>
+          <p:cNvSpPr>
+            <a:spLocks noGrp="1"/>
+          </p:cNvSpPr>
+          <p:nvPr>
+            <p:ph type="title"/>
+          </p:nvPr>
+        </p:nvSpPr>
+        <p:spPr/>
+        <p:txBody>
+          <a:bodyPr/>
+          <a:lstStyle/>
+          <a:p>
+            <a:r>
+              <a:rPr lang="en-US" dirty="0" smtClean="0"/>
+              <a:t>Admissibility</a:t>
+            </a:r>
+            <a:endParaRPr lang="en-US" dirty="0"/>
+          </a:p>
+        </p:txBody>
+      </p:sp>
+      <p:sp>
+        <p:nvSpPr>
+          <p:cNvPr id="3" name="Content Placeholder 2"/>
+          <p:cNvSpPr>
+            <a:spLocks noGrp="1"/>
+          </p:cNvSpPr>
+          <p:nvPr>
+            <p:ph idx="1"/>
+          </p:nvPr>
+        </p:nvSpPr>
+        <p:spPr/>
+        <p:txBody>
+          <a:bodyPr/>
+          <a:lstStyle/>
+          <a:p>
+            <a:r>
+              <a:rPr lang="en-US" dirty="0" smtClean="0"/>
+              <a:t>A* works when estimation is admissible</a:t>
+            </a:r>
+          </a:p>
+          <a:p>
+            <a:endParaRPr lang="en-US" dirty="0"/>
+          </a:p>
+          <a:p>
+            <a:r>
+              <a:rPr lang="en-US" dirty="0" smtClean="0"/>
+              <a:t>Never overestimates the actual cost</a:t>
+            </a:r>
+          </a:p>
+          <a:p>
+            <a:endParaRPr lang="en-US" dirty="0"/>
+          </a:p>
+          <a:p>
+            <a:r>
+              <a:rPr lang="en-US" dirty="0" smtClean="0"/>
+              <a:t>Common in search algorithms:</a:t>
+            </a:r>
+          </a:p>
+          <a:p>
+            <a:pPr lvl="1"/>
+            <a:r>
+              <a:rPr lang="en-US" dirty="0"/>
+              <a:t> </a:t>
+            </a:r>
+            <a:r>
+              <a:rPr lang="en-US" sz="1600" dirty="0"/>
+              <a:t>i.e. the cost it estimates to reach the goal is not higher than the lowest possible cost from the current point in the path</a:t>
+            </a:r>
+            <a:r>
+              <a:rPr lang="en-US" sz="1600" dirty="0" smtClean="0"/>
+              <a:t>.</a:t>
+            </a:r>
+            <a:endParaRPr lang="en-US" dirty="0"/>
+          </a:p>
+          <a:p>
+            <a:endParaRPr lang="en-US" dirty="0" smtClean="0"/>
+          </a:p>
+        </p:txBody>
+      </p:sp>
+    </p:spTree>
+    <p:extLst>
+      <p:ext uri="{BB962C8B-B14F-4D97-AF65-F5344CB8AC3E}">
+        <p14:creationId xmlns:p14="http://schemas.microsoft.com/office/powerpoint/2010/main" val="1965658938"/>
+      </p:ext>
+    </p:extLst>
+  </p:cSld>
+  <p:clrMapOvr>
+    <a:masterClrMapping/>
+  </p:clrMapOvr>
+  <p:timing>
+    <p:tnLst>
+      <p:par>
+        <p:cTn id="1" dur="indefinite" restart="never" nodeType="tmRoot"/>
+      </p:par>
+    </p:tnLst>
+  </p:timing>
+</p:sld>
+</file>
+
+<file path=ppt/slides/slide12.xml><?xml version="1.0" encoding="utf-8"?>
+<p:sld xmlns:a="http://schemas.openxmlformats.org/drawingml/2006/main" xmlns:r="http://schemas.openxmlformats.org/officeDocument/2006/relationships" xmlns:p="http://schemas.openxmlformats.org/presentationml/2006/main">
+  <p:cSld>
+    <p:spTree>
+      <p:nvGrpSpPr>
+        <p:cNvPr id="1" name=""/>
+        <p:cNvGrpSpPr/>
+        <p:nvPr/>
+      </p:nvGrpSpPr>
+      <p:grpSpPr>
+        <a:xfrm>
+          <a:off x="0" y="0"/>
+          <a:ext cx="0" cy="0"/>
+          <a:chOff x="0" y="0"/>
+          <a:chExt cx="0" cy="0"/>
+        </a:xfrm>
+      </p:grpSpPr>
+      <p:sp>
+        <p:nvSpPr>
+          <p:cNvPr id="3" name="Content Placeholder 2"/>
+          <p:cNvSpPr>
+            <a:spLocks noGrp="1"/>
+          </p:cNvSpPr>
+          <p:nvPr>
+            <p:ph idx="1"/>
+          </p:nvPr>
+        </p:nvSpPr>
+        <p:spPr>
+          <a:xfrm>
+            <a:off x="1103312" y="462708"/>
+            <a:ext cx="10343213" cy="5785691"/>
+          </a:xfrm>
+        </p:spPr>
+        <p:txBody>
+          <a:bodyPr/>
+          <a:lstStyle/>
+          <a:p>
+            <a:r>
+              <a:rPr lang="en-US" dirty="0" smtClean="0"/>
+              <a:t>n is a node</a:t>
+            </a:r>
+          </a:p>
+          <a:p>
+            <a:r>
+              <a:rPr lang="en-US" dirty="0" smtClean="0"/>
+              <a:t>h is a heuristic</a:t>
+            </a:r>
+          </a:p>
+          <a:p>
+            <a:r>
+              <a:rPr lang="en-US" dirty="0" smtClean="0"/>
+              <a:t>h(n) - cost by h to reach goal node from node n</a:t>
+            </a:r>
+          </a:p>
+          <a:p>
+            <a:r>
+              <a:rPr lang="en-US" dirty="0" smtClean="0"/>
+              <a:t>h*(n) – actual cost to reach goal from node n</a:t>
+            </a:r>
+          </a:p>
+          <a:p>
+            <a:endParaRPr lang="en-US" dirty="0"/>
+          </a:p>
+          <a:p>
+            <a:r>
+              <a:rPr lang="en-US" dirty="0" smtClean="0"/>
+              <a:t>h(n) is admissible only if,</a:t>
+            </a:r>
+          </a:p>
+          <a:p>
+            <a:pPr lvl="1"/>
+            <a:r>
+              <a:rPr lang="en-US" dirty="0" smtClean="0"/>
+              <a:t>For all n, h(n) &lt;= h*(n)</a:t>
+            </a:r>
+          </a:p>
+          <a:p>
+            <a:pPr lvl="1"/>
+            <a:endParaRPr lang="en-US" dirty="0"/>
+          </a:p>
+          <a:p>
+            <a:r>
+              <a:rPr lang="en-US" dirty="0"/>
+              <a:t>f</a:t>
+            </a:r>
+            <a:r>
+              <a:rPr lang="en-US" dirty="0" smtClean="0"/>
+              <a:t>(n) is calculated with the heuristic function as follows:</a:t>
+            </a:r>
+          </a:p>
+          <a:p>
+            <a:pPr lvl="1"/>
+            <a:r>
+              <a:rPr lang="en-US" dirty="0"/>
+              <a:t>f</a:t>
+            </a:r>
+            <a:r>
+              <a:rPr lang="en-US" dirty="0" smtClean="0"/>
+              <a:t>(n) – result amount</a:t>
+            </a:r>
+          </a:p>
+          <a:p>
+            <a:pPr lvl="1"/>
+            <a:r>
+              <a:rPr lang="en-US" dirty="0" smtClean="0"/>
+              <a:t>g(n) – cost from state to current node</a:t>
+            </a:r>
+          </a:p>
+          <a:p>
+            <a:pPr lvl="1"/>
+            <a:r>
+              <a:rPr lang="en-US" dirty="0" smtClean="0"/>
+              <a:t>h(n) – estimated cost from current node to goal</a:t>
+            </a:r>
+          </a:p>
+          <a:p>
+            <a:r>
+              <a:rPr lang="en-US" dirty="0"/>
+              <a:t>f</a:t>
+            </a:r>
+            <a:r>
+              <a:rPr lang="en-US" dirty="0" smtClean="0"/>
+              <a:t>(n) = g(n) + h(n)</a:t>
+            </a:r>
+            <a:r>
+              <a:rPr lang="en-US" dirty="0"/>
+              <a:t> </a:t>
+            </a:r>
+            <a:r>
+              <a:rPr lang="en-US" dirty="0" smtClean="0"/>
+              <a:t>  -   If h(n) is overestimated, one may overshoot optimal path</a:t>
+            </a:r>
+          </a:p>
+        </p:txBody>
+      </p:sp>
+    </p:spTree>
+    <p:extLst>
+      <p:ext uri="{BB962C8B-B14F-4D97-AF65-F5344CB8AC3E}">
+        <p14:creationId xmlns:p14="http://schemas.microsoft.com/office/powerpoint/2010/main" val="139696248"/>
+      </p:ext>
+    </p:extLst>
+  </p:cSld>
+  <p:clrMapOvr>
+    <a:masterClrMapping/>
+  </p:clrMapOvr>
+  <p:timing>
+    <p:tnLst>
+      <p:par>
+        <p:cTn id="1" dur="indefinite" restart="never" nodeType="tmRoot"/>
+      </p:par>
+    </p:tnLst>
+  </p:timing>
+</p:sld>
+</file>
+
+<file path=ppt/slides/slide13.xml><?xml version="1.0" encoding="utf-8"?>
+<p:sld xmlns:a="http://schemas.openxmlformats.org/drawingml/2006/main" xmlns:r="http://schemas.openxmlformats.org/officeDocument/2006/relationships" xmlns:p="http://schemas.openxmlformats.org/presentationml/2006/main">
+  <p:cSld>
+    <p:spTree>
+      <p:nvGrpSpPr>
+        <p:cNvPr id="1" name=""/>
+        <p:cNvGrpSpPr/>
+        <p:nvPr/>
+      </p:nvGrpSpPr>
+      <p:grpSpPr>
+        <a:xfrm>
+          <a:off x="0" y="0"/>
+          <a:ext cx="0" cy="0"/>
+          <a:chOff x="0" y="0"/>
+          <a:chExt cx="0" cy="0"/>
+        </a:xfrm>
+      </p:grpSpPr>
+      <p:sp>
+        <p:nvSpPr>
+          <p:cNvPr id="2" name="Title 1"/>
+          <p:cNvSpPr>
+            <a:spLocks noGrp="1"/>
+          </p:cNvSpPr>
+          <p:nvPr>
+            <p:ph type="title"/>
+          </p:nvPr>
+        </p:nvSpPr>
+        <p:spPr/>
+        <p:txBody>
+          <a:bodyPr/>
+          <a:lstStyle/>
+          <a:p>
+            <a:r>
+              <a:rPr lang="en-US" dirty="0" smtClean="0"/>
+              <a:t>A* prevalence in AI</a:t>
+            </a:r>
+            <a:endParaRPr lang="en-US" dirty="0"/>
+          </a:p>
+        </p:txBody>
+      </p:sp>
+      <p:sp>
+        <p:nvSpPr>
+          <p:cNvPr id="3" name="Content Placeholder 2"/>
+          <p:cNvSpPr>
+            <a:spLocks noGrp="1"/>
+          </p:cNvSpPr>
+          <p:nvPr>
+            <p:ph idx="1"/>
+          </p:nvPr>
+        </p:nvSpPr>
+        <p:spPr/>
+        <p:txBody>
+          <a:bodyPr/>
+          <a:lstStyle/>
+          <a:p>
+            <a:endParaRPr lang="en-US" dirty="0"/>
+          </a:p>
+        </p:txBody>
+      </p:sp>
+    </p:spTree>
+    <p:extLst>
+      <p:ext uri="{BB962C8B-B14F-4D97-AF65-F5344CB8AC3E}">
+        <p14:creationId xmlns:p14="http://schemas.microsoft.com/office/powerpoint/2010/main" val="1776226546"/>
       </p:ext>
     </p:extLst>
   </p:cSld>
@@ -6574,7 +7024,7 @@
           <a:p>
             <a:r>
               <a:rPr lang="en-US" dirty="0" smtClean="0"/>
-              <a:t>Example</a:t>
+              <a:t>“Real world” example</a:t>
             </a:r>
             <a:endParaRPr lang="en-US" dirty="0"/>
           </a:p>
@@ -6666,6 +7116,10 @@
           <a:bodyPr/>
           <a:lstStyle/>
           <a:p>
+            <a:r>
+              <a:rPr lang="en-US" dirty="0" smtClean="0"/>
+              <a:t>Dijkstra vs A*</a:t>
+            </a:r>
             <a:endParaRPr lang="en-US" dirty="0"/>
           </a:p>
         </p:txBody>
@@ -6685,7 +7139,46 @@
           <a:bodyPr/>
           <a:lstStyle/>
           <a:p>
-            <a:endParaRPr lang="en-US"/>
+            <a:r>
+              <a:rPr lang="en-US" dirty="0" smtClean="0"/>
+              <a:t>Difference only in how candidates are weighed</a:t>
+            </a:r>
+          </a:p>
+          <a:p>
+            <a:endParaRPr lang="en-US" dirty="0"/>
+          </a:p>
+          <a:p>
+            <a:r>
+              <a:rPr lang="en-US" dirty="0" smtClean="0"/>
+              <a:t>Dijkstra</a:t>
+            </a:r>
+          </a:p>
+          <a:p>
+            <a:pPr lvl="1"/>
+            <a:r>
+              <a:rPr lang="en-US" dirty="0" smtClean="0"/>
+              <a:t>Cost of edge + cost of previous node = length of current path</a:t>
+            </a:r>
+          </a:p>
+          <a:p>
+            <a:pPr lvl="1"/>
+            <a:endParaRPr lang="en-US" dirty="0"/>
+          </a:p>
+          <a:p>
+            <a:r>
+              <a:rPr lang="en-US" dirty="0"/>
+              <a:t>A</a:t>
+            </a:r>
+            <a:r>
+              <a:rPr lang="en-US" dirty="0" smtClean="0"/>
+              <a:t>*</a:t>
+            </a:r>
+          </a:p>
+          <a:p>
+            <a:r>
+              <a:rPr lang="en-US" dirty="0" smtClean="0"/>
+              <a:t>Cost of edge + cost of previous node + Estimated cost to reach target</a:t>
+            </a:r>
           </a:p>
         </p:txBody>
       </p:sp>
@@ -6706,6 +7199,390 @@
       </p:par>
     </p:tnLst>
   </p:timing>
+</p:sld>
+</file>
+
+<file path=ppt/slides/slide7.xml><?xml version="1.0" encoding="utf-8"?>
+<p:sld xmlns:a="http://schemas.openxmlformats.org/drawingml/2006/main" xmlns:r="http://schemas.openxmlformats.org/officeDocument/2006/relationships" xmlns:p="http://schemas.openxmlformats.org/presentationml/2006/main">
+  <p:cSld>
+    <p:spTree>
+      <p:nvGrpSpPr>
+        <p:cNvPr id="1" name=""/>
+        <p:cNvGrpSpPr/>
+        <p:nvPr/>
+      </p:nvGrpSpPr>
+      <p:grpSpPr>
+        <a:xfrm>
+          <a:off x="0" y="0"/>
+          <a:ext cx="0" cy="0"/>
+          <a:chOff x="0" y="0"/>
+          <a:chExt cx="0" cy="0"/>
+        </a:xfrm>
+      </p:grpSpPr>
+      <p:sp>
+        <p:nvSpPr>
+          <p:cNvPr id="2" name="Title 1"/>
+          <p:cNvSpPr>
+            <a:spLocks noGrp="1"/>
+          </p:cNvSpPr>
+          <p:nvPr>
+            <p:ph type="title"/>
+          </p:nvPr>
+        </p:nvSpPr>
+        <p:spPr/>
+        <p:txBody>
+          <a:bodyPr/>
+          <a:lstStyle/>
+          <a:p>
+            <a:r>
+              <a:rPr lang="en-US" dirty="0"/>
+              <a:t>Dijkstra vs A*</a:t>
+            </a:r>
+          </a:p>
+        </p:txBody>
+      </p:sp>
+      <p:sp>
+        <p:nvSpPr>
+          <p:cNvPr id="3" name="Content Placeholder 2"/>
+          <p:cNvSpPr>
+            <a:spLocks noGrp="1"/>
+          </p:cNvSpPr>
+          <p:nvPr>
+            <p:ph idx="1"/>
+          </p:nvPr>
+        </p:nvSpPr>
+        <p:spPr/>
+        <p:txBody>
+          <a:bodyPr/>
+          <a:lstStyle/>
+          <a:p>
+            <a:r>
+              <a:rPr lang="en-US" dirty="0" smtClean="0"/>
+              <a:t>Dijkstra’s Algorithm is actually a special case for A*</a:t>
+            </a:r>
+          </a:p>
+          <a:p>
+            <a:pPr lvl="1"/>
+            <a:r>
+              <a:rPr lang="en-US" dirty="0" smtClean="0"/>
+              <a:t>Estimated cost to each node is 0</a:t>
+            </a:r>
+            <a:endParaRPr lang="en-US" dirty="0"/>
+          </a:p>
+          <a:p>
+            <a:pPr lvl="1"/>
+            <a:endParaRPr lang="en-US" dirty="0" smtClean="0"/>
+          </a:p>
+          <a:p>
+            <a:r>
+              <a:rPr lang="en-US" dirty="0" smtClean="0"/>
+              <a:t>Estimation might seem counter intuitive</a:t>
+            </a:r>
+          </a:p>
+          <a:p>
+            <a:pPr lvl="1"/>
+            <a:r>
+              <a:rPr lang="en-US" dirty="0" smtClean="0"/>
+              <a:t>Exists only where it can</a:t>
+            </a:r>
+          </a:p>
+          <a:p>
+            <a:pPr lvl="1"/>
+            <a:r>
+              <a:rPr lang="en-US" dirty="0" smtClean="0"/>
+              <a:t>If estimation can’t occur, A* acts exactly like Dijkstra’s Algorithm</a:t>
+            </a:r>
+            <a:endParaRPr lang="en-US" dirty="0"/>
+          </a:p>
+        </p:txBody>
+      </p:sp>
+    </p:spTree>
+    <p:extLst>
+      <p:ext uri="{BB962C8B-B14F-4D97-AF65-F5344CB8AC3E}">
+        <p14:creationId xmlns:p14="http://schemas.microsoft.com/office/powerpoint/2010/main" val="1247739280"/>
+      </p:ext>
+    </p:extLst>
+  </p:cSld>
+  <p:clrMapOvr>
+    <a:masterClrMapping/>
+  </p:clrMapOvr>
+  <p:timing>
+    <p:tnLst>
+      <p:par>
+        <p:cTn id="1" dur="indefinite" restart="never" nodeType="tmRoot"/>
+      </p:par>
+    </p:tnLst>
+  </p:timing>
+</p:sld>
+</file>
+
+<file path=ppt/slides/slide8.xml><?xml version="1.0" encoding="utf-8"?>
+<p:sld xmlns:a="http://schemas.openxmlformats.org/drawingml/2006/main" xmlns:r="http://schemas.openxmlformats.org/officeDocument/2006/relationships" xmlns:p="http://schemas.openxmlformats.org/presentationml/2006/main">
+  <p:cSld>
+    <p:spTree>
+      <p:nvGrpSpPr>
+        <p:cNvPr id="1" name=""/>
+        <p:cNvGrpSpPr/>
+        <p:nvPr/>
+      </p:nvGrpSpPr>
+      <p:grpSpPr>
+        <a:xfrm>
+          <a:off x="0" y="0"/>
+          <a:ext cx="0" cy="0"/>
+          <a:chOff x="0" y="0"/>
+          <a:chExt cx="0" cy="0"/>
+        </a:xfrm>
+      </p:grpSpPr>
+      <p:sp>
+        <p:nvSpPr>
+          <p:cNvPr id="2" name="Title 1"/>
+          <p:cNvSpPr>
+            <a:spLocks noGrp="1"/>
+          </p:cNvSpPr>
+          <p:nvPr>
+            <p:ph type="title"/>
+          </p:nvPr>
+        </p:nvSpPr>
+        <p:spPr/>
+        <p:txBody>
+          <a:bodyPr/>
+          <a:lstStyle/>
+          <a:p>
+            <a:r>
+              <a:rPr lang="en-US" dirty="0" smtClean="0"/>
+              <a:t>Estimation example</a:t>
+            </a:r>
+            <a:endParaRPr lang="en-US" dirty="0"/>
+          </a:p>
+        </p:txBody>
+      </p:sp>
+      <p:sp>
+        <p:nvSpPr>
+          <p:cNvPr id="3" name="Content Placeholder 2"/>
+          <p:cNvSpPr>
+            <a:spLocks noGrp="1"/>
+          </p:cNvSpPr>
+          <p:nvPr>
+            <p:ph idx="1"/>
+          </p:nvPr>
+        </p:nvSpPr>
+        <p:spPr/>
+        <p:txBody>
+          <a:bodyPr/>
+          <a:lstStyle/>
+          <a:p>
+            <a:r>
+              <a:rPr lang="en-US" dirty="0" smtClean="0"/>
+              <a:t>Graph with weights can be drawn on 2D coordinate plane</a:t>
+            </a:r>
+          </a:p>
+          <a:p>
+            <a:endParaRPr lang="en-US" dirty="0" smtClean="0"/>
+          </a:p>
+          <a:p>
+            <a:r>
+              <a:rPr lang="en-US" dirty="0" smtClean="0"/>
+              <a:t>Estimation could be found using Distance formula</a:t>
+            </a:r>
+          </a:p>
+          <a:p>
+            <a:endParaRPr lang="en-US" dirty="0"/>
+          </a:p>
+          <a:p>
+            <a:r>
+              <a:rPr lang="en-US" dirty="0" smtClean="0"/>
+              <a:t>How I implemented shortest paths in example using pixel coordinates</a:t>
+            </a:r>
+          </a:p>
+          <a:p>
+            <a:endParaRPr lang="en-US" dirty="0"/>
+          </a:p>
+          <a:p>
+            <a:endParaRPr lang="en-US" dirty="0"/>
+          </a:p>
+        </p:txBody>
+      </p:sp>
+      <p:pic>
+        <p:nvPicPr>
+          <p:cNvPr id="4" name="Picture 3"/>
+          <p:cNvPicPr>
+            <a:picLocks noChangeAspect="1"/>
+          </p:cNvPicPr>
+          <p:nvPr/>
+        </p:nvPicPr>
+        <p:blipFill>
+          <a:blip r:embed="rId2">
+            <a:extLst>
+              <a:ext uri="{28A0092B-C50C-407E-A947-70E740481C1C}">
+                <a14:useLocalDpi xmlns:a14="http://schemas.microsoft.com/office/drawing/2010/main" val="0"/>
+              </a:ext>
+            </a:extLst>
+          </a:blip>
+          <a:stretch>
+            <a:fillRect/>
+          </a:stretch>
+        </p:blipFill>
+        <p:spPr>
+          <a:xfrm>
+            <a:off x="1351071" y="4541770"/>
+            <a:ext cx="8409874" cy="1514186"/>
+          </a:xfrm>
+          <a:prstGeom prst="rect">
+            <a:avLst/>
+          </a:prstGeom>
+        </p:spPr>
+      </p:pic>
+    </p:spTree>
+    <p:extLst>
+      <p:ext uri="{BB962C8B-B14F-4D97-AF65-F5344CB8AC3E}">
+        <p14:creationId xmlns:p14="http://schemas.microsoft.com/office/powerpoint/2010/main" val="1981522610"/>
+      </p:ext>
+    </p:extLst>
+  </p:cSld>
+  <p:clrMapOvr>
+    <a:masterClrMapping/>
+  </p:clrMapOvr>
+  <p:timing>
+    <p:tnLst>
+      <p:par>
+        <p:cTn id="1" dur="indefinite" restart="never" nodeType="tmRoot"/>
+      </p:par>
+    </p:tnLst>
+  </p:timing>
+</p:sld>
+</file>
+
+<file path=ppt/slides/slide9.xml><?xml version="1.0" encoding="utf-8"?>
+<p:sld xmlns:a="http://schemas.openxmlformats.org/drawingml/2006/main" xmlns:r="http://schemas.openxmlformats.org/officeDocument/2006/relationships" xmlns:p="http://schemas.openxmlformats.org/presentationml/2006/main">
+  <p:cSld>
+    <p:spTree>
+      <p:nvGrpSpPr>
+        <p:cNvPr id="1" name=""/>
+        <p:cNvGrpSpPr/>
+        <p:nvPr/>
+      </p:nvGrpSpPr>
+      <p:grpSpPr>
+        <a:xfrm>
+          <a:off x="0" y="0"/>
+          <a:ext cx="0" cy="0"/>
+          <a:chOff x="0" y="0"/>
+          <a:chExt cx="0" cy="0"/>
+        </a:xfrm>
+      </p:grpSpPr>
+      <p:sp>
+        <p:nvSpPr>
+          <p:cNvPr id="2" name="Title 1"/>
+          <p:cNvSpPr>
+            <a:spLocks noGrp="1"/>
+          </p:cNvSpPr>
+          <p:nvPr>
+            <p:ph type="title"/>
+          </p:nvPr>
+        </p:nvSpPr>
+        <p:spPr>
+          <a:xfrm>
+            <a:off x="535942" y="211031"/>
+            <a:ext cx="9404723" cy="1400530"/>
+          </a:xfrm>
+        </p:spPr>
+        <p:txBody>
+          <a:bodyPr/>
+          <a:lstStyle/>
+          <a:p>
+            <a:r>
+              <a:rPr lang="en-US" dirty="0" smtClean="0"/>
+              <a:t>Example 1</a:t>
+            </a:r>
+            <a:endParaRPr lang="en-US" dirty="0"/>
+          </a:p>
+        </p:txBody>
+      </p:sp>
+      <p:sp>
+        <p:nvSpPr>
+          <p:cNvPr id="3" name="Content Placeholder 2"/>
+          <p:cNvSpPr>
+            <a:spLocks noGrp="1"/>
+          </p:cNvSpPr>
+          <p:nvPr>
+            <p:ph idx="1"/>
+          </p:nvPr>
+        </p:nvSpPr>
+        <p:spPr>
+          <a:xfrm>
+            <a:off x="1446190" y="1028350"/>
+            <a:ext cx="8946541" cy="4195481"/>
+          </a:xfrm>
+        </p:spPr>
+        <p:txBody>
+          <a:bodyPr/>
+          <a:lstStyle/>
+          <a:p>
+            <a:r>
+              <a:rPr lang="en-US" dirty="0" smtClean="0"/>
+              <a:t>Left: Dijkstra’s Algorithm						Right: A* Algorithm</a:t>
+            </a:r>
+          </a:p>
+          <a:p>
+            <a:pPr lvl="1"/>
+            <a:r>
+              <a:rPr lang="en-US" dirty="0" smtClean="0"/>
+              <a:t>Red: Expanded nodes		Blue: Shortest path taken</a:t>
+            </a:r>
+            <a:endParaRPr lang="en-US" dirty="0"/>
+          </a:p>
+        </p:txBody>
+      </p:sp>
+      <p:pic>
+        <p:nvPicPr>
+          <p:cNvPr id="1026" name="Picture 2" descr="enter image description here"/>
+          <p:cNvPicPr>
+            <a:picLocks noChangeAspect="1" noChangeArrowheads="1"/>
+          </p:cNvPicPr>
+          <p:nvPr/>
+        </p:nvPicPr>
+        <p:blipFill>
+          <a:blip r:embed="rId2">
+            <a:extLst>
+              <a:ext uri="{28A0092B-C50C-407E-A947-70E740481C1C}">
+                <a14:useLocalDpi xmlns:a14="http://schemas.microsoft.com/office/drawing/2010/main" val="0"/>
+              </a:ext>
+            </a:extLst>
+          </a:blip>
+          <a:srcRect/>
+          <a:stretch>
+            <a:fillRect/>
+          </a:stretch>
+        </p:blipFill>
+        <p:spPr bwMode="auto">
+          <a:xfrm>
+            <a:off x="431668" y="1853248"/>
+            <a:ext cx="10975587" cy="4822974"/>
+          </a:xfrm>
+          <a:prstGeom prst="rect">
+            <a:avLst/>
+          </a:prstGeom>
+          <a:noFill/>
+          <a:extLst>
+            <a:ext uri="{909E8E84-426E-40DD-AFC4-6F175D3DCCD1}">
+              <a14:hiddenFill xmlns:a14="http://schemas.microsoft.com/office/drawing/2010/main">
+                <a:solidFill>
+                  <a:srgbClr val="FFFFFF"/>
+                </a:solidFill>
+              </a14:hiddenFill>
+            </a:ext>
+          </a:extLst>
+        </p:spPr>
+      </p:pic>
+    </p:spTree>
+    <p:extLst>
+      <p:ext uri="{BB962C8B-B14F-4D97-AF65-F5344CB8AC3E}">
+        <p14:creationId xmlns:p14="http://schemas.microsoft.com/office/powerpoint/2010/main" val="1943486206"/>
+      </p:ext>
+    </p:extLst>
+  </p:cSld>
+  <p:clrMapOvr>
+    <a:masterClrMapping/>
+  </p:clrMapOvr>
 </p:sld>
 </file>
 

</xml_diff>

<commit_message>
Nearly final changes, sending for review
</commit_message>
<xml_diff>
--- a/Documents/GraphTheoryPresentation.pptx
+++ b/Documents/GraphTheoryPresentation.pptx
@@ -6383,7 +6383,15 @@
             <a:pPr lvl="1"/>
             <a:r>
               <a:rPr lang="en-US" dirty="0" smtClean="0"/>
-              <a:t>g(n) – cost from state to current node</a:t>
+              <a:t>g(n) – cost from </a:t>
+            </a:r>
+            <a:r>
+              <a:rPr lang="en-US" dirty="0" smtClean="0"/>
+              <a:t>start </a:t>
+            </a:r>
+            <a:r>
+              <a:rPr lang="en-US" dirty="0" smtClean="0"/>
+              <a:t>to current node</a:t>
             </a:r>
           </a:p>
           <a:p>

</xml_diff>

<commit_message>
Making some slight changes to code
</commit_message>
<xml_diff>
--- a/Documents/GraphTheoryPresentation.pptx
+++ b/Documents/GraphTheoryPresentation.pptx
@@ -6383,15 +6383,7 @@
             <a:pPr lvl="1"/>
             <a:r>
               <a:rPr lang="en-US" dirty="0" smtClean="0"/>
-              <a:t>g(n) – cost from </a:t>
-            </a:r>
-            <a:r>
-              <a:rPr lang="en-US" dirty="0" smtClean="0"/>
-              <a:t>start </a:t>
-            </a:r>
-            <a:r>
-              <a:rPr lang="en-US" dirty="0" smtClean="0"/>
-              <a:t>to current node</a:t>
+              <a:t>g(n) – cost from start to current node</a:t>
             </a:r>
           </a:p>
           <a:p>

</xml_diff>

<commit_message>
Mostly finished powerpoint for Monday
</commit_message>
<xml_diff>
--- a/Documents/GraphTheoryPresentation.pptx
+++ b/Documents/GraphTheoryPresentation.pptx
@@ -6,18 +6,21 @@
   </p:sldMasterIdLst>
   <p:sldIdLst>
     <p:sldId id="256" r:id="rId2"/>
-    <p:sldId id="257" r:id="rId3"/>
-    <p:sldId id="258" r:id="rId4"/>
-    <p:sldId id="259" r:id="rId5"/>
-    <p:sldId id="260" r:id="rId6"/>
-    <p:sldId id="261" r:id="rId7"/>
-    <p:sldId id="263" r:id="rId8"/>
-    <p:sldId id="264" r:id="rId9"/>
-    <p:sldId id="268" r:id="rId10"/>
-    <p:sldId id="265" r:id="rId11"/>
+    <p:sldId id="272" r:id="rId3"/>
+    <p:sldId id="273" r:id="rId4"/>
+    <p:sldId id="257" r:id="rId5"/>
+    <p:sldId id="277" r:id="rId6"/>
+    <p:sldId id="258" r:id="rId7"/>
+    <p:sldId id="259" r:id="rId8"/>
+    <p:sldId id="261" r:id="rId9"/>
+    <p:sldId id="263" r:id="rId10"/>
+    <p:sldId id="268" r:id="rId11"/>
     <p:sldId id="266" r:id="rId12"/>
     <p:sldId id="267" r:id="rId13"/>
-    <p:sldId id="262" r:id="rId14"/>
+    <p:sldId id="276" r:id="rId14"/>
+    <p:sldId id="274" r:id="rId15"/>
+    <p:sldId id="275" r:id="rId16"/>
+    <p:sldId id="278" r:id="rId17"/>
   </p:sldIdLst>
   <p:sldSz cx="12192000" cy="6858000"/>
   <p:notesSz cx="6858000" cy="9144000"/>
@@ -6052,11 +6055,7 @@
             </a:r>
             <a:r>
               <a:rPr lang="en-US" sz="4800" smtClean="0"/>
-              <a:t>vs </a:t>
-            </a:r>
-            <a:r>
-              <a:rPr lang="en-US" sz="4800" smtClean="0"/>
-              <a:t>A*</a:t>
+              <a:t>vs A*</a:t>
             </a:r>
             <a:endParaRPr lang="en-US" sz="4800" dirty="0"/>
           </a:p>
@@ -6083,1384 +6082,6 @@
 </file>
 
 <file path=ppt/slides/slide10.xml><?xml version="1.0" encoding="utf-8"?>
-<p:sld xmlns:a="http://schemas.openxmlformats.org/drawingml/2006/main" xmlns:r="http://schemas.openxmlformats.org/officeDocument/2006/relationships" xmlns:p="http://schemas.openxmlformats.org/presentationml/2006/main">
-  <p:cSld>
-    <p:spTree>
-      <p:nvGrpSpPr>
-        <p:cNvPr id="1" name=""/>
-        <p:cNvGrpSpPr/>
-        <p:nvPr/>
-      </p:nvGrpSpPr>
-      <p:grpSpPr>
-        <a:xfrm>
-          <a:off x="0" y="0"/>
-          <a:ext cx="0" cy="0"/>
-          <a:chOff x="0" y="0"/>
-          <a:chExt cx="0" cy="0"/>
-        </a:xfrm>
-      </p:grpSpPr>
-      <p:sp>
-        <p:nvSpPr>
-          <p:cNvPr id="2" name="Title 1"/>
-          <p:cNvSpPr>
-            <a:spLocks noGrp="1"/>
-          </p:cNvSpPr>
-          <p:nvPr>
-            <p:ph type="title"/>
-          </p:nvPr>
-        </p:nvSpPr>
-        <p:spPr/>
-        <p:txBody>
-          <a:bodyPr/>
-          <a:lstStyle/>
-          <a:p>
-            <a:endParaRPr lang="en-US"/>
-          </a:p>
-        </p:txBody>
-      </p:sp>
-      <p:pic>
-        <p:nvPicPr>
-          <p:cNvPr id="6" name="Content Placeholder 5"/>
-          <p:cNvPicPr>
-            <a:picLocks noGrp="1" noChangeAspect="1"/>
-          </p:cNvPicPr>
-          <p:nvPr>
-            <p:ph idx="1"/>
-          </p:nvPr>
-        </p:nvPicPr>
-        <p:blipFill>
-          <a:blip r:embed="rId2">
-            <a:extLst>
-              <a:ext uri="{28A0092B-C50C-407E-A947-70E740481C1C}">
-                <a14:useLocalDpi xmlns:a14="http://schemas.microsoft.com/office/drawing/2010/main" val="0"/>
-              </a:ext>
-            </a:extLst>
-          </a:blip>
-          <a:stretch>
-            <a:fillRect/>
-          </a:stretch>
-        </p:blipFill>
-        <p:spPr>
-          <a:xfrm>
-            <a:off x="260892" y="201803"/>
-            <a:ext cx="11593257" cy="6521207"/>
-          </a:xfrm>
-        </p:spPr>
-      </p:pic>
-    </p:spTree>
-    <p:extLst>
-      <p:ext uri="{BB962C8B-B14F-4D97-AF65-F5344CB8AC3E}">
-        <p14:creationId xmlns:p14="http://schemas.microsoft.com/office/powerpoint/2010/main" val="3662948277"/>
-      </p:ext>
-    </p:extLst>
-  </p:cSld>
-  <p:clrMapOvr>
-    <a:masterClrMapping/>
-  </p:clrMapOvr>
-  <p:timing>
-    <p:tnLst>
-      <p:par>
-        <p:cTn id="1" dur="indefinite" restart="never" nodeType="tmRoot"/>
-      </p:par>
-    </p:tnLst>
-  </p:timing>
-</p:sld>
-</file>
-
-<file path=ppt/slides/slide11.xml><?xml version="1.0" encoding="utf-8"?>
-<p:sld xmlns:a="http://schemas.openxmlformats.org/drawingml/2006/main" xmlns:r="http://schemas.openxmlformats.org/officeDocument/2006/relationships" xmlns:p="http://schemas.openxmlformats.org/presentationml/2006/main">
-  <p:cSld>
-    <p:spTree>
-      <p:nvGrpSpPr>
-        <p:cNvPr id="1" name=""/>
-        <p:cNvGrpSpPr/>
-        <p:nvPr/>
-      </p:nvGrpSpPr>
-      <p:grpSpPr>
-        <a:xfrm>
-          <a:off x="0" y="0"/>
-          <a:ext cx="0" cy="0"/>
-          <a:chOff x="0" y="0"/>
-          <a:chExt cx="0" cy="0"/>
-        </a:xfrm>
-      </p:grpSpPr>
-      <p:sp>
-        <p:nvSpPr>
-          <p:cNvPr id="2" name="Title 1"/>
-          <p:cNvSpPr>
-            <a:spLocks noGrp="1"/>
-          </p:cNvSpPr>
-          <p:nvPr>
-            <p:ph type="title"/>
-          </p:nvPr>
-        </p:nvSpPr>
-        <p:spPr/>
-        <p:txBody>
-          <a:bodyPr/>
-          <a:lstStyle/>
-          <a:p>
-            <a:r>
-              <a:rPr lang="en-US" dirty="0" smtClean="0"/>
-              <a:t>Admissibility</a:t>
-            </a:r>
-            <a:endParaRPr lang="en-US" dirty="0"/>
-          </a:p>
-        </p:txBody>
-      </p:sp>
-      <p:sp>
-        <p:nvSpPr>
-          <p:cNvPr id="3" name="Content Placeholder 2"/>
-          <p:cNvSpPr>
-            <a:spLocks noGrp="1"/>
-          </p:cNvSpPr>
-          <p:nvPr>
-            <p:ph idx="1"/>
-          </p:nvPr>
-        </p:nvSpPr>
-        <p:spPr/>
-        <p:txBody>
-          <a:bodyPr/>
-          <a:lstStyle/>
-          <a:p>
-            <a:r>
-              <a:rPr lang="en-US" dirty="0" smtClean="0"/>
-              <a:t>A* works when estimation is admissible</a:t>
-            </a:r>
-          </a:p>
-          <a:p>
-            <a:endParaRPr lang="en-US" dirty="0"/>
-          </a:p>
-          <a:p>
-            <a:r>
-              <a:rPr lang="en-US" dirty="0" smtClean="0"/>
-              <a:t>Never overestimates the actual cost</a:t>
-            </a:r>
-          </a:p>
-          <a:p>
-            <a:endParaRPr lang="en-US" dirty="0"/>
-          </a:p>
-          <a:p>
-            <a:r>
-              <a:rPr lang="en-US" dirty="0" smtClean="0"/>
-              <a:t>Common in search algorithms:</a:t>
-            </a:r>
-          </a:p>
-          <a:p>
-            <a:pPr lvl="1"/>
-            <a:r>
-              <a:rPr lang="en-US" dirty="0"/>
-              <a:t> </a:t>
-            </a:r>
-            <a:r>
-              <a:rPr lang="en-US" sz="1600" dirty="0"/>
-              <a:t>i.e. the cost it estimates to reach the goal is not higher than the lowest possible cost from the current point in the path</a:t>
-            </a:r>
-            <a:r>
-              <a:rPr lang="en-US" sz="1600" dirty="0" smtClean="0"/>
-              <a:t>.</a:t>
-            </a:r>
-            <a:endParaRPr lang="en-US" dirty="0"/>
-          </a:p>
-          <a:p>
-            <a:endParaRPr lang="en-US" dirty="0" smtClean="0"/>
-          </a:p>
-        </p:txBody>
-      </p:sp>
-    </p:spTree>
-    <p:extLst>
-      <p:ext uri="{BB962C8B-B14F-4D97-AF65-F5344CB8AC3E}">
-        <p14:creationId xmlns:p14="http://schemas.microsoft.com/office/powerpoint/2010/main" val="1965658938"/>
-      </p:ext>
-    </p:extLst>
-  </p:cSld>
-  <p:clrMapOvr>
-    <a:masterClrMapping/>
-  </p:clrMapOvr>
-  <p:timing>
-    <p:tnLst>
-      <p:par>
-        <p:cTn id="1" dur="indefinite" restart="never" nodeType="tmRoot"/>
-      </p:par>
-    </p:tnLst>
-  </p:timing>
-</p:sld>
-</file>
-
-<file path=ppt/slides/slide12.xml><?xml version="1.0" encoding="utf-8"?>
-<p:sld xmlns:a="http://schemas.openxmlformats.org/drawingml/2006/main" xmlns:r="http://schemas.openxmlformats.org/officeDocument/2006/relationships" xmlns:p="http://schemas.openxmlformats.org/presentationml/2006/main">
-  <p:cSld>
-    <p:spTree>
-      <p:nvGrpSpPr>
-        <p:cNvPr id="1" name=""/>
-        <p:cNvGrpSpPr/>
-        <p:nvPr/>
-      </p:nvGrpSpPr>
-      <p:grpSpPr>
-        <a:xfrm>
-          <a:off x="0" y="0"/>
-          <a:ext cx="0" cy="0"/>
-          <a:chOff x="0" y="0"/>
-          <a:chExt cx="0" cy="0"/>
-        </a:xfrm>
-      </p:grpSpPr>
-      <p:sp>
-        <p:nvSpPr>
-          <p:cNvPr id="3" name="Content Placeholder 2"/>
-          <p:cNvSpPr>
-            <a:spLocks noGrp="1"/>
-          </p:cNvSpPr>
-          <p:nvPr>
-            <p:ph idx="1"/>
-          </p:nvPr>
-        </p:nvSpPr>
-        <p:spPr>
-          <a:xfrm>
-            <a:off x="1103312" y="462708"/>
-            <a:ext cx="10343213" cy="5785691"/>
-          </a:xfrm>
-        </p:spPr>
-        <p:txBody>
-          <a:bodyPr/>
-          <a:lstStyle/>
-          <a:p>
-            <a:r>
-              <a:rPr lang="en-US" dirty="0" smtClean="0"/>
-              <a:t>n is a node</a:t>
-            </a:r>
-          </a:p>
-          <a:p>
-            <a:r>
-              <a:rPr lang="en-US" dirty="0" smtClean="0"/>
-              <a:t>h is a heuristic</a:t>
-            </a:r>
-          </a:p>
-          <a:p>
-            <a:r>
-              <a:rPr lang="en-US" dirty="0" smtClean="0"/>
-              <a:t>h(n) - cost by h to reach goal node from node n</a:t>
-            </a:r>
-          </a:p>
-          <a:p>
-            <a:r>
-              <a:rPr lang="en-US" dirty="0" smtClean="0"/>
-              <a:t>h*(n) – actual cost to reach goal from node n</a:t>
-            </a:r>
-          </a:p>
-          <a:p>
-            <a:endParaRPr lang="en-US" dirty="0"/>
-          </a:p>
-          <a:p>
-            <a:r>
-              <a:rPr lang="en-US" dirty="0" smtClean="0"/>
-              <a:t>h(n) is admissible only if,</a:t>
-            </a:r>
-          </a:p>
-          <a:p>
-            <a:pPr lvl="1"/>
-            <a:r>
-              <a:rPr lang="en-US" dirty="0" smtClean="0"/>
-              <a:t>For all n, h(n) &lt;= h*(n)</a:t>
-            </a:r>
-          </a:p>
-          <a:p>
-            <a:pPr lvl="1"/>
-            <a:endParaRPr lang="en-US" dirty="0"/>
-          </a:p>
-          <a:p>
-            <a:r>
-              <a:rPr lang="en-US" dirty="0"/>
-              <a:t>f</a:t>
-            </a:r>
-            <a:r>
-              <a:rPr lang="en-US" dirty="0" smtClean="0"/>
-              <a:t>(n) is calculated with the heuristic function as follows:</a:t>
-            </a:r>
-          </a:p>
-          <a:p>
-            <a:pPr lvl="1"/>
-            <a:r>
-              <a:rPr lang="en-US" dirty="0"/>
-              <a:t>f</a:t>
-            </a:r>
-            <a:r>
-              <a:rPr lang="en-US" dirty="0" smtClean="0"/>
-              <a:t>(n) – result amount</a:t>
-            </a:r>
-          </a:p>
-          <a:p>
-            <a:pPr lvl="1"/>
-            <a:r>
-              <a:rPr lang="en-US" dirty="0" smtClean="0"/>
-              <a:t>g(n) – cost from start to current node</a:t>
-            </a:r>
-          </a:p>
-          <a:p>
-            <a:pPr lvl="1"/>
-            <a:r>
-              <a:rPr lang="en-US" dirty="0" smtClean="0"/>
-              <a:t>h(n) – estimated cost from current node to goal</a:t>
-            </a:r>
-          </a:p>
-          <a:p>
-            <a:r>
-              <a:rPr lang="en-US" dirty="0"/>
-              <a:t>f</a:t>
-            </a:r>
-            <a:r>
-              <a:rPr lang="en-US" dirty="0" smtClean="0"/>
-              <a:t>(n) = g(n) + h(n)</a:t>
-            </a:r>
-            <a:r>
-              <a:rPr lang="en-US" dirty="0"/>
-              <a:t> </a:t>
-            </a:r>
-            <a:r>
-              <a:rPr lang="en-US" dirty="0" smtClean="0"/>
-              <a:t>  -   If h(n) is overestimated, one may overshoot optimal path</a:t>
-            </a:r>
-          </a:p>
-        </p:txBody>
-      </p:sp>
-    </p:spTree>
-    <p:extLst>
-      <p:ext uri="{BB962C8B-B14F-4D97-AF65-F5344CB8AC3E}">
-        <p14:creationId xmlns:p14="http://schemas.microsoft.com/office/powerpoint/2010/main" val="139696248"/>
-      </p:ext>
-    </p:extLst>
-  </p:cSld>
-  <p:clrMapOvr>
-    <a:masterClrMapping/>
-  </p:clrMapOvr>
-  <p:timing>
-    <p:tnLst>
-      <p:par>
-        <p:cTn id="1" dur="indefinite" restart="never" nodeType="tmRoot"/>
-      </p:par>
-    </p:tnLst>
-  </p:timing>
-</p:sld>
-</file>
-
-<file path=ppt/slides/slide13.xml><?xml version="1.0" encoding="utf-8"?>
-<p:sld xmlns:a="http://schemas.openxmlformats.org/drawingml/2006/main" xmlns:r="http://schemas.openxmlformats.org/officeDocument/2006/relationships" xmlns:p="http://schemas.openxmlformats.org/presentationml/2006/main">
-  <p:cSld>
-    <p:spTree>
-      <p:nvGrpSpPr>
-        <p:cNvPr id="1" name=""/>
-        <p:cNvGrpSpPr/>
-        <p:nvPr/>
-      </p:nvGrpSpPr>
-      <p:grpSpPr>
-        <a:xfrm>
-          <a:off x="0" y="0"/>
-          <a:ext cx="0" cy="0"/>
-          <a:chOff x="0" y="0"/>
-          <a:chExt cx="0" cy="0"/>
-        </a:xfrm>
-      </p:grpSpPr>
-      <p:sp>
-        <p:nvSpPr>
-          <p:cNvPr id="2" name="Title 1"/>
-          <p:cNvSpPr>
-            <a:spLocks noGrp="1"/>
-          </p:cNvSpPr>
-          <p:nvPr>
-            <p:ph type="title"/>
-          </p:nvPr>
-        </p:nvSpPr>
-        <p:spPr/>
-        <p:txBody>
-          <a:bodyPr/>
-          <a:lstStyle/>
-          <a:p>
-            <a:r>
-              <a:rPr lang="en-US" dirty="0" smtClean="0"/>
-              <a:t>A* prevalence in AI</a:t>
-            </a:r>
-            <a:endParaRPr lang="en-US" dirty="0"/>
-          </a:p>
-        </p:txBody>
-      </p:sp>
-      <p:sp>
-        <p:nvSpPr>
-          <p:cNvPr id="3" name="Content Placeholder 2"/>
-          <p:cNvSpPr>
-            <a:spLocks noGrp="1"/>
-          </p:cNvSpPr>
-          <p:nvPr>
-            <p:ph idx="1"/>
-          </p:nvPr>
-        </p:nvSpPr>
-        <p:spPr/>
-        <p:txBody>
-          <a:bodyPr/>
-          <a:lstStyle/>
-          <a:p>
-            <a:endParaRPr lang="en-US" dirty="0"/>
-          </a:p>
-        </p:txBody>
-      </p:sp>
-    </p:spTree>
-    <p:extLst>
-      <p:ext uri="{BB962C8B-B14F-4D97-AF65-F5344CB8AC3E}">
-        <p14:creationId xmlns:p14="http://schemas.microsoft.com/office/powerpoint/2010/main" val="1776226546"/>
-      </p:ext>
-    </p:extLst>
-  </p:cSld>
-  <p:clrMapOvr>
-    <a:masterClrMapping/>
-  </p:clrMapOvr>
-  <p:timing>
-    <p:tnLst>
-      <p:par>
-        <p:cTn id="1" dur="indefinite" restart="never" nodeType="tmRoot"/>
-      </p:par>
-    </p:tnLst>
-  </p:timing>
-</p:sld>
-</file>
-
-<file path=ppt/slides/slide2.xml><?xml version="1.0" encoding="utf-8"?>
-<p:sld xmlns:a="http://schemas.openxmlformats.org/drawingml/2006/main" xmlns:r="http://schemas.openxmlformats.org/officeDocument/2006/relationships" xmlns:p="http://schemas.openxmlformats.org/presentationml/2006/main">
-  <p:cSld>
-    <p:spTree>
-      <p:nvGrpSpPr>
-        <p:cNvPr id="1" name=""/>
-        <p:cNvGrpSpPr/>
-        <p:nvPr/>
-      </p:nvGrpSpPr>
-      <p:grpSpPr>
-        <a:xfrm>
-          <a:off x="0" y="0"/>
-          <a:ext cx="0" cy="0"/>
-          <a:chOff x="0" y="0"/>
-          <a:chExt cx="0" cy="0"/>
-        </a:xfrm>
-      </p:grpSpPr>
-      <p:sp>
-        <p:nvSpPr>
-          <p:cNvPr id="2" name="Title 1"/>
-          <p:cNvSpPr>
-            <a:spLocks noGrp="1"/>
-          </p:cNvSpPr>
-          <p:nvPr>
-            <p:ph type="title"/>
-          </p:nvPr>
-        </p:nvSpPr>
-        <p:spPr/>
-        <p:txBody>
-          <a:bodyPr/>
-          <a:lstStyle/>
-          <a:p>
-            <a:r>
-              <a:rPr lang="en-US" dirty="0" smtClean="0"/>
-              <a:t>Dijkstra’s Pathfinding Algorithm</a:t>
-            </a:r>
-            <a:endParaRPr lang="en-US" dirty="0"/>
-          </a:p>
-        </p:txBody>
-      </p:sp>
-      <p:sp>
-        <p:nvSpPr>
-          <p:cNvPr id="3" name="Content Placeholder 2"/>
-          <p:cNvSpPr>
-            <a:spLocks noGrp="1"/>
-          </p:cNvSpPr>
-          <p:nvPr>
-            <p:ph idx="1"/>
-          </p:nvPr>
-        </p:nvSpPr>
-        <p:spPr/>
-        <p:txBody>
-          <a:bodyPr/>
-          <a:lstStyle/>
-          <a:p>
-            <a:r>
-              <a:rPr lang="en-US" dirty="0" smtClean="0"/>
-              <a:t>Uniform Cost Search</a:t>
-            </a:r>
-          </a:p>
-          <a:p>
-            <a:endParaRPr lang="en-US" dirty="0" smtClean="0"/>
-          </a:p>
-          <a:p>
-            <a:r>
-              <a:rPr lang="en-US" dirty="0" smtClean="0"/>
-              <a:t>Space complexity</a:t>
-            </a:r>
-          </a:p>
-          <a:p>
-            <a:pPr lvl="1"/>
-            <a:r>
-              <a:rPr lang="en-US" dirty="0" smtClean="0"/>
-              <a:t>O(|V|</a:t>
-            </a:r>
-            <a:r>
-              <a:rPr lang="en-US" baseline="30000" dirty="0" smtClean="0"/>
-              <a:t>2</a:t>
-            </a:r>
-            <a:r>
-              <a:rPr lang="en-US" dirty="0" smtClean="0"/>
-              <a:t>)</a:t>
-            </a:r>
-            <a:endParaRPr lang="en-US" dirty="0"/>
-          </a:p>
-          <a:p>
-            <a:endParaRPr lang="en-US" dirty="0"/>
-          </a:p>
-          <a:p>
-            <a:r>
-              <a:rPr lang="en-US" dirty="0" smtClean="0"/>
-              <a:t>Time complexity </a:t>
-            </a:r>
-          </a:p>
-          <a:p>
-            <a:pPr lvl="1"/>
-            <a:r>
-              <a:rPr lang="en-US" dirty="0" smtClean="0"/>
-              <a:t>If |E| &gt; |V|</a:t>
-            </a:r>
-            <a:r>
-              <a:rPr lang="en-US" baseline="30000" dirty="0" smtClean="0"/>
-              <a:t>2</a:t>
-            </a:r>
-            <a:r>
-              <a:rPr lang="en-US" dirty="0" smtClean="0"/>
-              <a:t> , then O(|V|</a:t>
-            </a:r>
-            <a:r>
-              <a:rPr lang="en-US" baseline="30000" dirty="0" smtClean="0"/>
-              <a:t>2</a:t>
-            </a:r>
-            <a:r>
-              <a:rPr lang="en-US" dirty="0"/>
-              <a:t>) </a:t>
-            </a:r>
-            <a:endParaRPr lang="en-US" dirty="0" smtClean="0"/>
-          </a:p>
-          <a:p>
-            <a:pPr lvl="1"/>
-            <a:r>
-              <a:rPr lang="en-US" dirty="0" smtClean="0"/>
-              <a:t>If |E| &lt; </a:t>
-            </a:r>
-            <a:r>
-              <a:rPr lang="en-US" dirty="0"/>
-              <a:t>|V|</a:t>
-            </a:r>
-            <a:r>
-              <a:rPr lang="en-US" baseline="30000" dirty="0"/>
-              <a:t>2</a:t>
-            </a:r>
-            <a:r>
-              <a:rPr lang="en-US" dirty="0"/>
-              <a:t> , then </a:t>
-            </a:r>
-            <a:r>
-              <a:rPr lang="en-US" dirty="0" smtClean="0"/>
-              <a:t>O(|</a:t>
-            </a:r>
-            <a:r>
-              <a:rPr lang="en-US" dirty="0" err="1" smtClean="0"/>
-              <a:t>E|log</a:t>
-            </a:r>
-            <a:r>
-              <a:rPr lang="en-US" dirty="0" smtClean="0"/>
-              <a:t>(|V|)) </a:t>
-            </a:r>
-          </a:p>
-          <a:p>
-            <a:pPr lvl="1"/>
-            <a:endParaRPr lang="en-US" dirty="0"/>
-          </a:p>
-          <a:p>
-            <a:pPr lvl="1"/>
-            <a:endParaRPr lang="en-US" dirty="0" smtClean="0"/>
-          </a:p>
-        </p:txBody>
-      </p:sp>
-      <p:sp>
-        <p:nvSpPr>
-          <p:cNvPr id="4" name="TextBox 3"/>
-          <p:cNvSpPr txBox="1"/>
-          <p:nvPr/>
-        </p:nvSpPr>
-        <p:spPr>
-          <a:xfrm>
-            <a:off x="6664525" y="6399085"/>
-            <a:ext cx="5527475" cy="646331"/>
-          </a:xfrm>
-          <a:prstGeom prst="rect">
-            <a:avLst/>
-          </a:prstGeom>
-          <a:noFill/>
-        </p:spPr>
-        <p:txBody>
-          <a:bodyPr wrap="none" rtlCol="0">
-            <a:spAutoFit/>
-          </a:bodyPr>
-          <a:lstStyle/>
-          <a:p>
-            <a:r>
-              <a:rPr lang="en-US" sz="1200" dirty="0" smtClean="0">
-                <a:hlinkClick r:id="rId2"/>
-              </a:rPr>
-              <a:t>http://www-m3.ma.tum.de/foswiki/pub/MN0506/WebHome/dijkstra.pdf</a:t>
-            </a:r>
-            <a:endParaRPr lang="en-US" sz="1200" dirty="0" smtClean="0"/>
-          </a:p>
-          <a:p>
-            <a:r>
-              <a:rPr lang="en-US" sz="1200" dirty="0" smtClean="0">
-                <a:hlinkClick r:id="rId3"/>
-              </a:rPr>
-              <a:t>http://matwbn.icm.edu.pl/ksiazki/cc/cc35/cc3536.pdf</a:t>
-            </a:r>
-            <a:endParaRPr lang="en-US" sz="1200" dirty="0" smtClean="0"/>
-          </a:p>
-          <a:p>
-            <a:endParaRPr lang="en-US" sz="1200" dirty="0"/>
-          </a:p>
-        </p:txBody>
-      </p:sp>
-    </p:spTree>
-    <p:extLst>
-      <p:ext uri="{BB962C8B-B14F-4D97-AF65-F5344CB8AC3E}">
-        <p14:creationId xmlns:p14="http://schemas.microsoft.com/office/powerpoint/2010/main" val="1287779507"/>
-      </p:ext>
-    </p:extLst>
-  </p:cSld>
-  <p:clrMapOvr>
-    <a:masterClrMapping/>
-  </p:clrMapOvr>
-  <p:timing>
-    <p:tnLst>
-      <p:par>
-        <p:cTn id="1" dur="indefinite" restart="never" nodeType="tmRoot"/>
-      </p:par>
-    </p:tnLst>
-  </p:timing>
-</p:sld>
-</file>
-
-<file path=ppt/slides/slide3.xml><?xml version="1.0" encoding="utf-8"?>
-<p:sld xmlns:a="http://schemas.openxmlformats.org/drawingml/2006/main" xmlns:r="http://schemas.openxmlformats.org/officeDocument/2006/relationships" xmlns:p="http://schemas.openxmlformats.org/presentationml/2006/main">
-  <p:cSld>
-    <p:spTree>
-      <p:nvGrpSpPr>
-        <p:cNvPr id="1" name=""/>
-        <p:cNvGrpSpPr/>
-        <p:nvPr/>
-      </p:nvGrpSpPr>
-      <p:grpSpPr>
-        <a:xfrm>
-          <a:off x="0" y="0"/>
-          <a:ext cx="0" cy="0"/>
-          <a:chOff x="0" y="0"/>
-          <a:chExt cx="0" cy="0"/>
-        </a:xfrm>
-      </p:grpSpPr>
-      <p:sp>
-        <p:nvSpPr>
-          <p:cNvPr id="2" name="Title 1"/>
-          <p:cNvSpPr>
-            <a:spLocks noGrp="1"/>
-          </p:cNvSpPr>
-          <p:nvPr>
-            <p:ph type="title"/>
-          </p:nvPr>
-        </p:nvSpPr>
-        <p:spPr/>
-        <p:txBody>
-          <a:bodyPr/>
-          <a:lstStyle/>
-          <a:p>
-            <a:r>
-              <a:rPr lang="en-US" dirty="0" smtClean="0"/>
-              <a:t>A* Pathfinding Heuristic</a:t>
-            </a:r>
-            <a:endParaRPr lang="en-US" dirty="0"/>
-          </a:p>
-        </p:txBody>
-      </p:sp>
-      <p:sp>
-        <p:nvSpPr>
-          <p:cNvPr id="3" name="Content Placeholder 2"/>
-          <p:cNvSpPr>
-            <a:spLocks noGrp="1"/>
-          </p:cNvSpPr>
-          <p:nvPr>
-            <p:ph idx="1"/>
-          </p:nvPr>
-        </p:nvSpPr>
-        <p:spPr/>
-        <p:txBody>
-          <a:bodyPr/>
-          <a:lstStyle/>
-          <a:p>
-            <a:r>
-              <a:rPr lang="en-US" dirty="0" smtClean="0"/>
-              <a:t>Guided Breadth first search</a:t>
-            </a:r>
-          </a:p>
-          <a:p>
-            <a:endParaRPr lang="en-US" dirty="0"/>
-          </a:p>
-          <a:p>
-            <a:r>
-              <a:rPr lang="en-US" dirty="0" smtClean="0"/>
-              <a:t>Space Complexity </a:t>
-            </a:r>
-          </a:p>
-          <a:p>
-            <a:pPr lvl="1"/>
-            <a:r>
-              <a:rPr lang="en-US" dirty="0" smtClean="0"/>
-              <a:t>O(n) where n is length of solution path</a:t>
-            </a:r>
-          </a:p>
-          <a:p>
-            <a:pPr lvl="1"/>
-            <a:r>
-              <a:rPr lang="en-US" dirty="0" smtClean="0"/>
-              <a:t>Absolute worst case: O(|V|)</a:t>
-            </a:r>
-          </a:p>
-          <a:p>
-            <a:endParaRPr lang="en-US" dirty="0"/>
-          </a:p>
-          <a:p>
-            <a:r>
-              <a:rPr lang="en-US" dirty="0" smtClean="0"/>
-              <a:t>Time Complexity </a:t>
-            </a:r>
-          </a:p>
-          <a:p>
-            <a:pPr lvl="1"/>
-            <a:r>
-              <a:rPr lang="en-US" dirty="0" smtClean="0"/>
-              <a:t>O(n)</a:t>
-            </a:r>
-            <a:r>
-              <a:rPr lang="en-US" dirty="0"/>
-              <a:t> where n is length of solution </a:t>
-            </a:r>
-            <a:r>
-              <a:rPr lang="en-US" dirty="0" smtClean="0"/>
-              <a:t>path</a:t>
-            </a:r>
-          </a:p>
-          <a:p>
-            <a:pPr lvl="1"/>
-            <a:r>
-              <a:rPr lang="en-US" dirty="0" smtClean="0"/>
-              <a:t>Absolute worst case: O(|V|)</a:t>
-            </a:r>
-            <a:endParaRPr lang="en-US" dirty="0"/>
-          </a:p>
-        </p:txBody>
-      </p:sp>
-    </p:spTree>
-    <p:extLst>
-      <p:ext uri="{BB962C8B-B14F-4D97-AF65-F5344CB8AC3E}">
-        <p14:creationId xmlns:p14="http://schemas.microsoft.com/office/powerpoint/2010/main" val="1525539646"/>
-      </p:ext>
-    </p:extLst>
-  </p:cSld>
-  <p:clrMapOvr>
-    <a:masterClrMapping/>
-  </p:clrMapOvr>
-  <p:timing>
-    <p:tnLst>
-      <p:par>
-        <p:cTn id="1" dur="indefinite" restart="never" nodeType="tmRoot"/>
-      </p:par>
-    </p:tnLst>
-  </p:timing>
-</p:sld>
-</file>
-
-<file path=ppt/slides/slide4.xml><?xml version="1.0" encoding="utf-8"?>
-<p:sld xmlns:a="http://schemas.openxmlformats.org/drawingml/2006/main" xmlns:r="http://schemas.openxmlformats.org/officeDocument/2006/relationships" xmlns:p="http://schemas.openxmlformats.org/presentationml/2006/main">
-  <p:cSld>
-    <p:spTree>
-      <p:nvGrpSpPr>
-        <p:cNvPr id="1" name=""/>
-        <p:cNvGrpSpPr/>
-        <p:nvPr/>
-      </p:nvGrpSpPr>
-      <p:grpSpPr>
-        <a:xfrm>
-          <a:off x="0" y="0"/>
-          <a:ext cx="0" cy="0"/>
-          <a:chOff x="0" y="0"/>
-          <a:chExt cx="0" cy="0"/>
-        </a:xfrm>
-      </p:grpSpPr>
-      <p:sp>
-        <p:nvSpPr>
-          <p:cNvPr id="2" name="Title 1"/>
-          <p:cNvSpPr>
-            <a:spLocks noGrp="1"/>
-          </p:cNvSpPr>
-          <p:nvPr>
-            <p:ph type="title"/>
-          </p:nvPr>
-        </p:nvSpPr>
-        <p:spPr/>
-        <p:txBody>
-          <a:bodyPr/>
-          <a:lstStyle/>
-          <a:p>
-            <a:r>
-              <a:rPr lang="en-US" dirty="0" smtClean="0"/>
-              <a:t>A* Developed in 1968</a:t>
-            </a:r>
-            <a:endParaRPr lang="en-US" dirty="0"/>
-          </a:p>
-        </p:txBody>
-      </p:sp>
-      <p:sp>
-        <p:nvSpPr>
-          <p:cNvPr id="3" name="Content Placeholder 2"/>
-          <p:cNvSpPr>
-            <a:spLocks noGrp="1"/>
-          </p:cNvSpPr>
-          <p:nvPr>
-            <p:ph idx="1"/>
-          </p:nvPr>
-        </p:nvSpPr>
-        <p:spPr/>
-        <p:txBody>
-          <a:bodyPr/>
-          <a:lstStyle/>
-          <a:p>
-            <a:r>
-              <a:rPr lang="en-US" dirty="0" smtClean="0"/>
-              <a:t>To improve path planning done by </a:t>
-            </a:r>
-            <a:r>
-              <a:rPr lang="en-US" dirty="0" err="1" smtClean="0"/>
-              <a:t>Shakey</a:t>
-            </a:r>
-            <a:r>
-              <a:rPr lang="en-US" dirty="0" smtClean="0"/>
-              <a:t> the Robot</a:t>
-            </a:r>
-          </a:p>
-          <a:p>
-            <a:endParaRPr lang="en-US" dirty="0"/>
-          </a:p>
-          <a:p>
-            <a:r>
-              <a:rPr lang="en-US" dirty="0" smtClean="0"/>
-              <a:t>To develop faster alternative to Dijkstra’s Algorithm</a:t>
-            </a:r>
-          </a:p>
-          <a:p>
-            <a:endParaRPr lang="en-US" dirty="0"/>
-          </a:p>
-          <a:p>
-            <a:r>
-              <a:rPr lang="en-US" dirty="0" smtClean="0"/>
-              <a:t>Find heuristic that was optimal under certain conditions</a:t>
-            </a:r>
-          </a:p>
-          <a:p>
-            <a:endParaRPr lang="en-US" dirty="0"/>
-          </a:p>
-          <a:p>
-            <a:r>
-              <a:rPr lang="en-US" dirty="0" smtClean="0"/>
-              <a:t>Uses what “appears” to be shortest path to increase speed</a:t>
-            </a:r>
-            <a:endParaRPr lang="en-US" dirty="0"/>
-          </a:p>
-        </p:txBody>
-      </p:sp>
-    </p:spTree>
-    <p:extLst>
-      <p:ext uri="{BB962C8B-B14F-4D97-AF65-F5344CB8AC3E}">
-        <p14:creationId xmlns:p14="http://schemas.microsoft.com/office/powerpoint/2010/main" val="2731621611"/>
-      </p:ext>
-    </p:extLst>
-  </p:cSld>
-  <p:clrMapOvr>
-    <a:masterClrMapping/>
-  </p:clrMapOvr>
-  <p:timing>
-    <p:tnLst>
-      <p:par>
-        <p:cTn id="1" dur="indefinite" restart="never" nodeType="tmRoot"/>
-      </p:par>
-    </p:tnLst>
-  </p:timing>
-</p:sld>
-</file>
-
-<file path=ppt/slides/slide5.xml><?xml version="1.0" encoding="utf-8"?>
-<p:sld xmlns:a="http://schemas.openxmlformats.org/drawingml/2006/main" xmlns:r="http://schemas.openxmlformats.org/officeDocument/2006/relationships" xmlns:p="http://schemas.openxmlformats.org/presentationml/2006/main">
-  <p:cSld>
-    <p:spTree>
-      <p:nvGrpSpPr>
-        <p:cNvPr id="1" name=""/>
-        <p:cNvGrpSpPr/>
-        <p:nvPr/>
-      </p:nvGrpSpPr>
-      <p:grpSpPr>
-        <a:xfrm>
-          <a:off x="0" y="0"/>
-          <a:ext cx="0" cy="0"/>
-          <a:chOff x="0" y="0"/>
-          <a:chExt cx="0" cy="0"/>
-        </a:xfrm>
-      </p:grpSpPr>
-      <p:sp>
-        <p:nvSpPr>
-          <p:cNvPr id="2" name="Title 1"/>
-          <p:cNvSpPr>
-            <a:spLocks noGrp="1"/>
-          </p:cNvSpPr>
-          <p:nvPr>
-            <p:ph type="title"/>
-          </p:nvPr>
-        </p:nvSpPr>
-        <p:spPr/>
-        <p:txBody>
-          <a:bodyPr/>
-          <a:lstStyle/>
-          <a:p>
-            <a:r>
-              <a:rPr lang="en-US" dirty="0" smtClean="0"/>
-              <a:t>“Real world” example</a:t>
-            </a:r>
-            <a:endParaRPr lang="en-US" dirty="0"/>
-          </a:p>
-        </p:txBody>
-      </p:sp>
-      <p:sp>
-        <p:nvSpPr>
-          <p:cNvPr id="3" name="Content Placeholder 2"/>
-          <p:cNvSpPr>
-            <a:spLocks noGrp="1"/>
-          </p:cNvSpPr>
-          <p:nvPr>
-            <p:ph idx="1"/>
-          </p:nvPr>
-        </p:nvSpPr>
-        <p:spPr/>
-        <p:txBody>
-          <a:bodyPr/>
-          <a:lstStyle/>
-          <a:p>
-            <a:r>
-              <a:rPr lang="en-US" dirty="0">
-                <a:hlinkClick r:id="rId2"/>
-              </a:rPr>
-              <a:t>http://stevengantz.com/GraphTheoryProject2016</a:t>
-            </a:r>
-            <a:r>
-              <a:rPr lang="en-US" dirty="0" smtClean="0">
-                <a:hlinkClick r:id="rId2"/>
-              </a:rPr>
-              <a:t>/</a:t>
-            </a:r>
-            <a:endParaRPr lang="en-US" dirty="0" smtClean="0"/>
-          </a:p>
-          <a:p>
-            <a:endParaRPr lang="en-US" dirty="0"/>
-          </a:p>
-        </p:txBody>
-      </p:sp>
-    </p:spTree>
-    <p:extLst>
-      <p:ext uri="{BB962C8B-B14F-4D97-AF65-F5344CB8AC3E}">
-        <p14:creationId xmlns:p14="http://schemas.microsoft.com/office/powerpoint/2010/main" val="639672041"/>
-      </p:ext>
-    </p:extLst>
-  </p:cSld>
-  <p:clrMapOvr>
-    <a:masterClrMapping/>
-  </p:clrMapOvr>
-  <p:timing>
-    <p:tnLst>
-      <p:par>
-        <p:cTn id="1" dur="indefinite" restart="never" nodeType="tmRoot"/>
-      </p:par>
-    </p:tnLst>
-  </p:timing>
-</p:sld>
-</file>
-
-<file path=ppt/slides/slide6.xml><?xml version="1.0" encoding="utf-8"?>
-<p:sld xmlns:a="http://schemas.openxmlformats.org/drawingml/2006/main" xmlns:r="http://schemas.openxmlformats.org/officeDocument/2006/relationships" xmlns:p="http://schemas.openxmlformats.org/presentationml/2006/main">
-  <p:cSld>
-    <p:spTree>
-      <p:nvGrpSpPr>
-        <p:cNvPr id="1" name=""/>
-        <p:cNvGrpSpPr/>
-        <p:nvPr/>
-      </p:nvGrpSpPr>
-      <p:grpSpPr>
-        <a:xfrm>
-          <a:off x="0" y="0"/>
-          <a:ext cx="0" cy="0"/>
-          <a:chOff x="0" y="0"/>
-          <a:chExt cx="0" cy="0"/>
-        </a:xfrm>
-      </p:grpSpPr>
-      <p:sp>
-        <p:nvSpPr>
-          <p:cNvPr id="2" name="Title 1"/>
-          <p:cNvSpPr>
-            <a:spLocks noGrp="1"/>
-          </p:cNvSpPr>
-          <p:nvPr>
-            <p:ph type="title"/>
-          </p:nvPr>
-        </p:nvSpPr>
-        <p:spPr/>
-        <p:txBody>
-          <a:bodyPr/>
-          <a:lstStyle/>
-          <a:p>
-            <a:r>
-              <a:rPr lang="en-US" dirty="0" smtClean="0"/>
-              <a:t>Dijkstra vs A*</a:t>
-            </a:r>
-            <a:endParaRPr lang="en-US" dirty="0"/>
-          </a:p>
-        </p:txBody>
-      </p:sp>
-      <p:sp>
-        <p:nvSpPr>
-          <p:cNvPr id="3" name="Content Placeholder 2"/>
-          <p:cNvSpPr>
-            <a:spLocks noGrp="1"/>
-          </p:cNvSpPr>
-          <p:nvPr>
-            <p:ph idx="1"/>
-          </p:nvPr>
-        </p:nvSpPr>
-        <p:spPr/>
-        <p:txBody>
-          <a:bodyPr/>
-          <a:lstStyle/>
-          <a:p>
-            <a:r>
-              <a:rPr lang="en-US" dirty="0" smtClean="0"/>
-              <a:t>Difference only in how candidates are weighed</a:t>
-            </a:r>
-          </a:p>
-          <a:p>
-            <a:endParaRPr lang="en-US" dirty="0"/>
-          </a:p>
-          <a:p>
-            <a:r>
-              <a:rPr lang="en-US" dirty="0" smtClean="0"/>
-              <a:t>Dijkstra</a:t>
-            </a:r>
-          </a:p>
-          <a:p>
-            <a:pPr lvl="1"/>
-            <a:r>
-              <a:rPr lang="en-US" dirty="0" smtClean="0"/>
-              <a:t>Cost of edge + cost of previous node = length of current path</a:t>
-            </a:r>
-          </a:p>
-          <a:p>
-            <a:pPr lvl="1"/>
-            <a:endParaRPr lang="en-US" dirty="0"/>
-          </a:p>
-          <a:p>
-            <a:r>
-              <a:rPr lang="en-US" dirty="0"/>
-              <a:t>A</a:t>
-            </a:r>
-            <a:r>
-              <a:rPr lang="en-US" dirty="0" smtClean="0"/>
-              <a:t>*</a:t>
-            </a:r>
-          </a:p>
-          <a:p>
-            <a:r>
-              <a:rPr lang="en-US" dirty="0" smtClean="0"/>
-              <a:t>Cost of edge + cost of previous node + Estimated cost to reach target</a:t>
-            </a:r>
-          </a:p>
-        </p:txBody>
-      </p:sp>
-    </p:spTree>
-    <p:extLst>
-      <p:ext uri="{BB962C8B-B14F-4D97-AF65-F5344CB8AC3E}">
-        <p14:creationId xmlns:p14="http://schemas.microsoft.com/office/powerpoint/2010/main" val="1356365731"/>
-      </p:ext>
-    </p:extLst>
-  </p:cSld>
-  <p:clrMapOvr>
-    <a:masterClrMapping/>
-  </p:clrMapOvr>
-  <p:timing>
-    <p:tnLst>
-      <p:par>
-        <p:cTn id="1" dur="indefinite" restart="never" nodeType="tmRoot"/>
-      </p:par>
-    </p:tnLst>
-  </p:timing>
-</p:sld>
-</file>
-
-<file path=ppt/slides/slide7.xml><?xml version="1.0" encoding="utf-8"?>
-<p:sld xmlns:a="http://schemas.openxmlformats.org/drawingml/2006/main" xmlns:r="http://schemas.openxmlformats.org/officeDocument/2006/relationships" xmlns:p="http://schemas.openxmlformats.org/presentationml/2006/main">
-  <p:cSld>
-    <p:spTree>
-      <p:nvGrpSpPr>
-        <p:cNvPr id="1" name=""/>
-        <p:cNvGrpSpPr/>
-        <p:nvPr/>
-      </p:nvGrpSpPr>
-      <p:grpSpPr>
-        <a:xfrm>
-          <a:off x="0" y="0"/>
-          <a:ext cx="0" cy="0"/>
-          <a:chOff x="0" y="0"/>
-          <a:chExt cx="0" cy="0"/>
-        </a:xfrm>
-      </p:grpSpPr>
-      <p:sp>
-        <p:nvSpPr>
-          <p:cNvPr id="2" name="Title 1"/>
-          <p:cNvSpPr>
-            <a:spLocks noGrp="1"/>
-          </p:cNvSpPr>
-          <p:nvPr>
-            <p:ph type="title"/>
-          </p:nvPr>
-        </p:nvSpPr>
-        <p:spPr/>
-        <p:txBody>
-          <a:bodyPr/>
-          <a:lstStyle/>
-          <a:p>
-            <a:r>
-              <a:rPr lang="en-US" dirty="0"/>
-              <a:t>Dijkstra vs A*</a:t>
-            </a:r>
-          </a:p>
-        </p:txBody>
-      </p:sp>
-      <p:sp>
-        <p:nvSpPr>
-          <p:cNvPr id="3" name="Content Placeholder 2"/>
-          <p:cNvSpPr>
-            <a:spLocks noGrp="1"/>
-          </p:cNvSpPr>
-          <p:nvPr>
-            <p:ph idx="1"/>
-          </p:nvPr>
-        </p:nvSpPr>
-        <p:spPr/>
-        <p:txBody>
-          <a:bodyPr/>
-          <a:lstStyle/>
-          <a:p>
-            <a:r>
-              <a:rPr lang="en-US" dirty="0" smtClean="0"/>
-              <a:t>Dijkstra’s Algorithm is actually a special case for A*</a:t>
-            </a:r>
-          </a:p>
-          <a:p>
-            <a:pPr lvl="1"/>
-            <a:r>
-              <a:rPr lang="en-US" dirty="0" smtClean="0"/>
-              <a:t>Estimated cost to each node is 0</a:t>
-            </a:r>
-            <a:endParaRPr lang="en-US" dirty="0"/>
-          </a:p>
-          <a:p>
-            <a:pPr lvl="1"/>
-            <a:endParaRPr lang="en-US" dirty="0" smtClean="0"/>
-          </a:p>
-          <a:p>
-            <a:r>
-              <a:rPr lang="en-US" dirty="0" smtClean="0"/>
-              <a:t>Estimation might seem counter intuitive</a:t>
-            </a:r>
-          </a:p>
-          <a:p>
-            <a:pPr lvl="1"/>
-            <a:r>
-              <a:rPr lang="en-US" dirty="0" smtClean="0"/>
-              <a:t>Exists only where it can</a:t>
-            </a:r>
-          </a:p>
-          <a:p>
-            <a:pPr lvl="1"/>
-            <a:r>
-              <a:rPr lang="en-US" dirty="0" smtClean="0"/>
-              <a:t>If estimation can’t occur, A* acts exactly like Dijkstra’s Algorithm</a:t>
-            </a:r>
-            <a:endParaRPr lang="en-US" dirty="0"/>
-          </a:p>
-        </p:txBody>
-      </p:sp>
-    </p:spTree>
-    <p:extLst>
-      <p:ext uri="{BB962C8B-B14F-4D97-AF65-F5344CB8AC3E}">
-        <p14:creationId xmlns:p14="http://schemas.microsoft.com/office/powerpoint/2010/main" val="1247739280"/>
-      </p:ext>
-    </p:extLst>
-  </p:cSld>
-  <p:clrMapOvr>
-    <a:masterClrMapping/>
-  </p:clrMapOvr>
-  <p:timing>
-    <p:tnLst>
-      <p:par>
-        <p:cTn id="1" dur="indefinite" restart="never" nodeType="tmRoot"/>
-      </p:par>
-    </p:tnLst>
-  </p:timing>
-</p:sld>
-</file>
-
-<file path=ppt/slides/slide8.xml><?xml version="1.0" encoding="utf-8"?>
-<p:sld xmlns:a="http://schemas.openxmlformats.org/drawingml/2006/main" xmlns:r="http://schemas.openxmlformats.org/officeDocument/2006/relationships" xmlns:p="http://schemas.openxmlformats.org/presentationml/2006/main">
-  <p:cSld>
-    <p:spTree>
-      <p:nvGrpSpPr>
-        <p:cNvPr id="1" name=""/>
-        <p:cNvGrpSpPr/>
-        <p:nvPr/>
-      </p:nvGrpSpPr>
-      <p:grpSpPr>
-        <a:xfrm>
-          <a:off x="0" y="0"/>
-          <a:ext cx="0" cy="0"/>
-          <a:chOff x="0" y="0"/>
-          <a:chExt cx="0" cy="0"/>
-        </a:xfrm>
-      </p:grpSpPr>
-      <p:sp>
-        <p:nvSpPr>
-          <p:cNvPr id="2" name="Title 1"/>
-          <p:cNvSpPr>
-            <a:spLocks noGrp="1"/>
-          </p:cNvSpPr>
-          <p:nvPr>
-            <p:ph type="title"/>
-          </p:nvPr>
-        </p:nvSpPr>
-        <p:spPr/>
-        <p:txBody>
-          <a:bodyPr/>
-          <a:lstStyle/>
-          <a:p>
-            <a:r>
-              <a:rPr lang="en-US" dirty="0" smtClean="0"/>
-              <a:t>Estimation example</a:t>
-            </a:r>
-            <a:endParaRPr lang="en-US" dirty="0"/>
-          </a:p>
-        </p:txBody>
-      </p:sp>
-      <p:sp>
-        <p:nvSpPr>
-          <p:cNvPr id="3" name="Content Placeholder 2"/>
-          <p:cNvSpPr>
-            <a:spLocks noGrp="1"/>
-          </p:cNvSpPr>
-          <p:nvPr>
-            <p:ph idx="1"/>
-          </p:nvPr>
-        </p:nvSpPr>
-        <p:spPr/>
-        <p:txBody>
-          <a:bodyPr/>
-          <a:lstStyle/>
-          <a:p>
-            <a:r>
-              <a:rPr lang="en-US" dirty="0" smtClean="0"/>
-              <a:t>Graph with weights can be drawn on 2D coordinate plane</a:t>
-            </a:r>
-          </a:p>
-          <a:p>
-            <a:endParaRPr lang="en-US" dirty="0" smtClean="0"/>
-          </a:p>
-          <a:p>
-            <a:r>
-              <a:rPr lang="en-US" dirty="0" smtClean="0"/>
-              <a:t>Estimation could be found using Distance formula</a:t>
-            </a:r>
-          </a:p>
-          <a:p>
-            <a:endParaRPr lang="en-US" dirty="0"/>
-          </a:p>
-          <a:p>
-            <a:r>
-              <a:rPr lang="en-US" dirty="0" smtClean="0"/>
-              <a:t>How I implemented shortest paths in example using pixel coordinates</a:t>
-            </a:r>
-          </a:p>
-          <a:p>
-            <a:endParaRPr lang="en-US" dirty="0"/>
-          </a:p>
-          <a:p>
-            <a:endParaRPr lang="en-US" dirty="0"/>
-          </a:p>
-        </p:txBody>
-      </p:sp>
-      <p:pic>
-        <p:nvPicPr>
-          <p:cNvPr id="4" name="Picture 3"/>
-          <p:cNvPicPr>
-            <a:picLocks noChangeAspect="1"/>
-          </p:cNvPicPr>
-          <p:nvPr/>
-        </p:nvPicPr>
-        <p:blipFill>
-          <a:blip r:embed="rId2">
-            <a:extLst>
-              <a:ext uri="{28A0092B-C50C-407E-A947-70E740481C1C}">
-                <a14:useLocalDpi xmlns:a14="http://schemas.microsoft.com/office/drawing/2010/main" val="0"/>
-              </a:ext>
-            </a:extLst>
-          </a:blip>
-          <a:stretch>
-            <a:fillRect/>
-          </a:stretch>
-        </p:blipFill>
-        <p:spPr>
-          <a:xfrm>
-            <a:off x="1351071" y="4541770"/>
-            <a:ext cx="8409874" cy="1514186"/>
-          </a:xfrm>
-          <a:prstGeom prst="rect">
-            <a:avLst/>
-          </a:prstGeom>
-        </p:spPr>
-      </p:pic>
-    </p:spTree>
-    <p:extLst>
-      <p:ext uri="{BB962C8B-B14F-4D97-AF65-F5344CB8AC3E}">
-        <p14:creationId xmlns:p14="http://schemas.microsoft.com/office/powerpoint/2010/main" val="1981522610"/>
-      </p:ext>
-    </p:extLst>
-  </p:cSld>
-  <p:clrMapOvr>
-    <a:masterClrMapping/>
-  </p:clrMapOvr>
-  <p:timing>
-    <p:tnLst>
-      <p:par>
-        <p:cTn id="1" dur="indefinite" restart="never" nodeType="tmRoot"/>
-      </p:par>
-    </p:tnLst>
-  </p:timing>
-</p:sld>
-</file>
-
-<file path=ppt/slides/slide9.xml><?xml version="1.0" encoding="utf-8"?>
 <p:sld xmlns:a="http://schemas.openxmlformats.org/drawingml/2006/main" xmlns:r="http://schemas.openxmlformats.org/officeDocument/2006/relationships" xmlns:p="http://schemas.openxmlformats.org/presentationml/2006/main">
   <p:cSld>
     <p:spTree>
@@ -7591,6 +6212,2124 @@
   <p:clrMapOvr>
     <a:masterClrMapping/>
   </p:clrMapOvr>
+</p:sld>
+</file>
+
+<file path=ppt/slides/slide11.xml><?xml version="1.0" encoding="utf-8"?>
+<p:sld xmlns:a="http://schemas.openxmlformats.org/drawingml/2006/main" xmlns:r="http://schemas.openxmlformats.org/officeDocument/2006/relationships" xmlns:p="http://schemas.openxmlformats.org/presentationml/2006/main">
+  <p:cSld>
+    <p:spTree>
+      <p:nvGrpSpPr>
+        <p:cNvPr id="1" name=""/>
+        <p:cNvGrpSpPr/>
+        <p:nvPr/>
+      </p:nvGrpSpPr>
+      <p:grpSpPr>
+        <a:xfrm>
+          <a:off x="0" y="0"/>
+          <a:ext cx="0" cy="0"/>
+          <a:chOff x="0" y="0"/>
+          <a:chExt cx="0" cy="0"/>
+        </a:xfrm>
+      </p:grpSpPr>
+      <p:sp>
+        <p:nvSpPr>
+          <p:cNvPr id="2" name="Title 1"/>
+          <p:cNvSpPr>
+            <a:spLocks noGrp="1"/>
+          </p:cNvSpPr>
+          <p:nvPr>
+            <p:ph type="title"/>
+          </p:nvPr>
+        </p:nvSpPr>
+        <p:spPr/>
+        <p:txBody>
+          <a:bodyPr/>
+          <a:lstStyle/>
+          <a:p>
+            <a:r>
+              <a:rPr lang="en-US" dirty="0" smtClean="0"/>
+              <a:t>Admissibility</a:t>
+            </a:r>
+            <a:endParaRPr lang="en-US" dirty="0"/>
+          </a:p>
+        </p:txBody>
+      </p:sp>
+      <p:sp>
+        <p:nvSpPr>
+          <p:cNvPr id="3" name="Content Placeholder 2"/>
+          <p:cNvSpPr>
+            <a:spLocks noGrp="1"/>
+          </p:cNvSpPr>
+          <p:nvPr>
+            <p:ph idx="1"/>
+          </p:nvPr>
+        </p:nvSpPr>
+        <p:spPr/>
+        <p:txBody>
+          <a:bodyPr/>
+          <a:lstStyle/>
+          <a:p>
+            <a:r>
+              <a:rPr lang="en-US" dirty="0" smtClean="0"/>
+              <a:t>A* works when estimation is admissible</a:t>
+            </a:r>
+          </a:p>
+          <a:p>
+            <a:endParaRPr lang="en-US" dirty="0"/>
+          </a:p>
+          <a:p>
+            <a:r>
+              <a:rPr lang="en-US" dirty="0" smtClean="0"/>
+              <a:t>Never overestimates the actual cost</a:t>
+            </a:r>
+          </a:p>
+          <a:p>
+            <a:endParaRPr lang="en-US" dirty="0"/>
+          </a:p>
+          <a:p>
+            <a:r>
+              <a:rPr lang="en-US" dirty="0" smtClean="0"/>
+              <a:t>Common in search algorithms:</a:t>
+            </a:r>
+          </a:p>
+          <a:p>
+            <a:pPr lvl="1"/>
+            <a:r>
+              <a:rPr lang="en-US" dirty="0"/>
+              <a:t> </a:t>
+            </a:r>
+            <a:r>
+              <a:rPr lang="en-US" sz="1600" dirty="0"/>
+              <a:t>i.e. the cost it estimates to reach the goal is not higher than the lowest possible cost from the current point in the path</a:t>
+            </a:r>
+            <a:r>
+              <a:rPr lang="en-US" sz="1600" dirty="0" smtClean="0"/>
+              <a:t>.</a:t>
+            </a:r>
+            <a:endParaRPr lang="en-US" dirty="0"/>
+          </a:p>
+          <a:p>
+            <a:endParaRPr lang="en-US" dirty="0" smtClean="0"/>
+          </a:p>
+        </p:txBody>
+      </p:sp>
+    </p:spTree>
+    <p:extLst>
+      <p:ext uri="{BB962C8B-B14F-4D97-AF65-F5344CB8AC3E}">
+        <p14:creationId xmlns:p14="http://schemas.microsoft.com/office/powerpoint/2010/main" val="1965658938"/>
+      </p:ext>
+    </p:extLst>
+  </p:cSld>
+  <p:clrMapOvr>
+    <a:masterClrMapping/>
+  </p:clrMapOvr>
+  <p:timing>
+    <p:tnLst>
+      <p:par>
+        <p:cTn id="1" dur="indefinite" restart="never" nodeType="tmRoot"/>
+      </p:par>
+    </p:tnLst>
+  </p:timing>
+</p:sld>
+</file>
+
+<file path=ppt/slides/slide12.xml><?xml version="1.0" encoding="utf-8"?>
+<p:sld xmlns:a="http://schemas.openxmlformats.org/drawingml/2006/main" xmlns:r="http://schemas.openxmlformats.org/officeDocument/2006/relationships" xmlns:p="http://schemas.openxmlformats.org/presentationml/2006/main">
+  <p:cSld>
+    <p:spTree>
+      <p:nvGrpSpPr>
+        <p:cNvPr id="1" name=""/>
+        <p:cNvGrpSpPr/>
+        <p:nvPr/>
+      </p:nvGrpSpPr>
+      <p:grpSpPr>
+        <a:xfrm>
+          <a:off x="0" y="0"/>
+          <a:ext cx="0" cy="0"/>
+          <a:chOff x="0" y="0"/>
+          <a:chExt cx="0" cy="0"/>
+        </a:xfrm>
+      </p:grpSpPr>
+      <p:sp>
+        <p:nvSpPr>
+          <p:cNvPr id="3" name="Content Placeholder 2"/>
+          <p:cNvSpPr>
+            <a:spLocks noGrp="1"/>
+          </p:cNvSpPr>
+          <p:nvPr>
+            <p:ph idx="1"/>
+          </p:nvPr>
+        </p:nvSpPr>
+        <p:spPr>
+          <a:xfrm>
+            <a:off x="1103312" y="462708"/>
+            <a:ext cx="10343213" cy="5785691"/>
+          </a:xfrm>
+        </p:spPr>
+        <p:txBody>
+          <a:bodyPr/>
+          <a:lstStyle/>
+          <a:p>
+            <a:r>
+              <a:rPr lang="en-US" dirty="0" smtClean="0"/>
+              <a:t>n is a node</a:t>
+            </a:r>
+          </a:p>
+          <a:p>
+            <a:r>
+              <a:rPr lang="en-US" dirty="0" smtClean="0"/>
+              <a:t>h is a heuristic</a:t>
+            </a:r>
+          </a:p>
+          <a:p>
+            <a:r>
+              <a:rPr lang="en-US" dirty="0" smtClean="0"/>
+              <a:t>h(n) - cost by h to reach goal node from node n</a:t>
+            </a:r>
+          </a:p>
+          <a:p>
+            <a:r>
+              <a:rPr lang="en-US" dirty="0" smtClean="0"/>
+              <a:t>h*(n) – actual cost to reach goal from node n</a:t>
+            </a:r>
+          </a:p>
+          <a:p>
+            <a:endParaRPr lang="en-US" dirty="0"/>
+          </a:p>
+          <a:p>
+            <a:r>
+              <a:rPr lang="en-US" dirty="0" smtClean="0"/>
+              <a:t>h(n) is admissible only if,</a:t>
+            </a:r>
+          </a:p>
+          <a:p>
+            <a:pPr lvl="1"/>
+            <a:r>
+              <a:rPr lang="en-US" dirty="0" smtClean="0"/>
+              <a:t>For all n, h(n) &lt;= h*(n)</a:t>
+            </a:r>
+          </a:p>
+          <a:p>
+            <a:pPr lvl="1"/>
+            <a:endParaRPr lang="en-US" dirty="0"/>
+          </a:p>
+          <a:p>
+            <a:r>
+              <a:rPr lang="en-US" dirty="0"/>
+              <a:t>f</a:t>
+            </a:r>
+            <a:r>
+              <a:rPr lang="en-US" dirty="0" smtClean="0"/>
+              <a:t>(n) is calculated with the heuristic function as follows:</a:t>
+            </a:r>
+          </a:p>
+          <a:p>
+            <a:pPr lvl="1"/>
+            <a:r>
+              <a:rPr lang="en-US" dirty="0"/>
+              <a:t>f</a:t>
+            </a:r>
+            <a:r>
+              <a:rPr lang="en-US" dirty="0" smtClean="0"/>
+              <a:t>(n) – result amount</a:t>
+            </a:r>
+          </a:p>
+          <a:p>
+            <a:pPr lvl="1"/>
+            <a:r>
+              <a:rPr lang="en-US" dirty="0" smtClean="0"/>
+              <a:t>g(n) – cost from start to current node</a:t>
+            </a:r>
+          </a:p>
+          <a:p>
+            <a:pPr lvl="1"/>
+            <a:r>
+              <a:rPr lang="en-US" dirty="0" smtClean="0"/>
+              <a:t>h(n) – estimated cost from current node to goal</a:t>
+            </a:r>
+          </a:p>
+          <a:p>
+            <a:r>
+              <a:rPr lang="en-US" dirty="0"/>
+              <a:t>f</a:t>
+            </a:r>
+            <a:r>
+              <a:rPr lang="en-US" dirty="0" smtClean="0"/>
+              <a:t>(n) = g(n) + h(n)</a:t>
+            </a:r>
+            <a:r>
+              <a:rPr lang="en-US" dirty="0"/>
+              <a:t> </a:t>
+            </a:r>
+            <a:r>
+              <a:rPr lang="en-US" dirty="0" smtClean="0"/>
+              <a:t>  -   If h(n) is overestimated, one may overshoot optimal path</a:t>
+            </a:r>
+          </a:p>
+        </p:txBody>
+      </p:sp>
+    </p:spTree>
+    <p:extLst>
+      <p:ext uri="{BB962C8B-B14F-4D97-AF65-F5344CB8AC3E}">
+        <p14:creationId xmlns:p14="http://schemas.microsoft.com/office/powerpoint/2010/main" val="139696248"/>
+      </p:ext>
+    </p:extLst>
+  </p:cSld>
+  <p:clrMapOvr>
+    <a:masterClrMapping/>
+  </p:clrMapOvr>
+  <p:timing>
+    <p:tnLst>
+      <p:par>
+        <p:cTn id="1" dur="indefinite" restart="never" nodeType="tmRoot"/>
+      </p:par>
+    </p:tnLst>
+  </p:timing>
+</p:sld>
+</file>
+
+<file path=ppt/slides/slide13.xml><?xml version="1.0" encoding="utf-8"?>
+<p:sld xmlns:a="http://schemas.openxmlformats.org/drawingml/2006/main" xmlns:r="http://schemas.openxmlformats.org/officeDocument/2006/relationships" xmlns:p="http://schemas.openxmlformats.org/presentationml/2006/main">
+  <p:cSld>
+    <p:spTree>
+      <p:nvGrpSpPr>
+        <p:cNvPr id="1" name=""/>
+        <p:cNvGrpSpPr/>
+        <p:nvPr/>
+      </p:nvGrpSpPr>
+      <p:grpSpPr>
+        <a:xfrm>
+          <a:off x="0" y="0"/>
+          <a:ext cx="0" cy="0"/>
+          <a:chOff x="0" y="0"/>
+          <a:chExt cx="0" cy="0"/>
+        </a:xfrm>
+      </p:grpSpPr>
+      <p:sp>
+        <p:nvSpPr>
+          <p:cNvPr id="2" name="Title 1"/>
+          <p:cNvSpPr>
+            <a:spLocks noGrp="1"/>
+          </p:cNvSpPr>
+          <p:nvPr>
+            <p:ph type="title"/>
+          </p:nvPr>
+        </p:nvSpPr>
+        <p:spPr/>
+        <p:txBody>
+          <a:bodyPr/>
+          <a:lstStyle/>
+          <a:p>
+            <a:r>
+              <a:rPr lang="en-US" dirty="0" smtClean="0"/>
+              <a:t>Approximations</a:t>
+            </a:r>
+            <a:endParaRPr lang="en-US" dirty="0"/>
+          </a:p>
+        </p:txBody>
+      </p:sp>
+      <p:sp>
+        <p:nvSpPr>
+          <p:cNvPr id="3" name="Content Placeholder 2"/>
+          <p:cNvSpPr>
+            <a:spLocks noGrp="1"/>
+          </p:cNvSpPr>
+          <p:nvPr>
+            <p:ph idx="1"/>
+          </p:nvPr>
+        </p:nvSpPr>
+        <p:spPr/>
+        <p:txBody>
+          <a:bodyPr/>
+          <a:lstStyle/>
+          <a:p>
+            <a:r>
+              <a:rPr lang="en-US" dirty="0" smtClean="0"/>
+              <a:t>Depending on application, speed may be weighed more importantly than correctness</a:t>
+            </a:r>
+            <a:endParaRPr lang="en-US" dirty="0"/>
+          </a:p>
+          <a:p>
+            <a:endParaRPr lang="en-US" dirty="0"/>
+          </a:p>
+          <a:p>
+            <a:r>
+              <a:rPr lang="en-US" dirty="0" smtClean="0"/>
+              <a:t>Approximate heuristic can give less correct paths faster</a:t>
+            </a:r>
+          </a:p>
+          <a:p>
+            <a:endParaRPr lang="en-US" dirty="0"/>
+          </a:p>
+          <a:p>
+            <a:r>
+              <a:rPr lang="en-US" dirty="0" smtClean="0"/>
+              <a:t>Video game pathfinding</a:t>
+            </a:r>
+          </a:p>
+          <a:p>
+            <a:r>
+              <a:rPr lang="en-US" dirty="0" smtClean="0"/>
+              <a:t>Need of small space complexity</a:t>
+            </a:r>
+          </a:p>
+          <a:p>
+            <a:r>
+              <a:rPr lang="en-US" dirty="0" smtClean="0"/>
+              <a:t>Navigation (without pre-compiled paths)</a:t>
+            </a:r>
+            <a:endParaRPr lang="en-US" dirty="0"/>
+          </a:p>
+        </p:txBody>
+      </p:sp>
+    </p:spTree>
+    <p:extLst>
+      <p:ext uri="{BB962C8B-B14F-4D97-AF65-F5344CB8AC3E}">
+        <p14:creationId xmlns:p14="http://schemas.microsoft.com/office/powerpoint/2010/main" val="1585829360"/>
+      </p:ext>
+    </p:extLst>
+  </p:cSld>
+  <p:clrMapOvr>
+    <a:masterClrMapping/>
+  </p:clrMapOvr>
+</p:sld>
+</file>
+
+<file path=ppt/slides/slide14.xml><?xml version="1.0" encoding="utf-8"?>
+<p:sld xmlns:a="http://schemas.openxmlformats.org/drawingml/2006/main" xmlns:r="http://schemas.openxmlformats.org/officeDocument/2006/relationships" xmlns:p="http://schemas.openxmlformats.org/presentationml/2006/main">
+  <p:cSld>
+    <p:spTree>
+      <p:nvGrpSpPr>
+        <p:cNvPr id="1" name=""/>
+        <p:cNvGrpSpPr/>
+        <p:nvPr/>
+      </p:nvGrpSpPr>
+      <p:grpSpPr>
+        <a:xfrm>
+          <a:off x="0" y="0"/>
+          <a:ext cx="0" cy="0"/>
+          <a:chOff x="0" y="0"/>
+          <a:chExt cx="0" cy="0"/>
+        </a:xfrm>
+      </p:grpSpPr>
+      <p:sp>
+        <p:nvSpPr>
+          <p:cNvPr id="2" name="Title 1"/>
+          <p:cNvSpPr>
+            <a:spLocks noGrp="1"/>
+          </p:cNvSpPr>
+          <p:nvPr>
+            <p:ph type="title"/>
+          </p:nvPr>
+        </p:nvSpPr>
+        <p:spPr>
+          <a:xfrm>
+            <a:off x="97471" y="342990"/>
+            <a:ext cx="9404723" cy="1400530"/>
+          </a:xfrm>
+        </p:spPr>
+        <p:txBody>
+          <a:bodyPr/>
+          <a:lstStyle/>
+          <a:p>
+            <a:r>
+              <a:rPr lang="en-US" dirty="0" smtClean="0"/>
+              <a:t>Dijkstra’s</a:t>
+            </a:r>
+            <a:br>
+              <a:rPr lang="en-US" dirty="0" smtClean="0"/>
+            </a:br>
+            <a:r>
+              <a:rPr lang="en-US" dirty="0" err="1" smtClean="0"/>
+              <a:t>Algo</a:t>
+            </a:r>
+            <a:r>
+              <a:rPr lang="en-US" dirty="0" smtClean="0"/>
+              <a:t> Ex. </a:t>
+            </a:r>
+            <a:endParaRPr lang="en-US" dirty="0"/>
+          </a:p>
+        </p:txBody>
+      </p:sp>
+      <p:pic>
+        <p:nvPicPr>
+          <p:cNvPr id="4" name="Content Placeholder 3"/>
+          <p:cNvPicPr>
+            <a:picLocks noGrp="1" noChangeAspect="1"/>
+          </p:cNvPicPr>
+          <p:nvPr>
+            <p:ph idx="1"/>
+          </p:nvPr>
+        </p:nvPicPr>
+        <p:blipFill rotWithShape="1">
+          <a:blip r:embed="rId2" cstate="print">
+            <a:extLst>
+              <a:ext uri="{28A0092B-C50C-407E-A947-70E740481C1C}">
+                <a14:useLocalDpi xmlns:a14="http://schemas.microsoft.com/office/drawing/2010/main" val="0"/>
+              </a:ext>
+            </a:extLst>
+          </a:blip>
+          <a:srcRect l="13268" r="13903"/>
+          <a:stretch/>
+        </p:blipFill>
+        <p:spPr>
+          <a:xfrm>
+            <a:off x="3502152" y="159830"/>
+            <a:ext cx="8430768" cy="6511540"/>
+          </a:xfrm>
+        </p:spPr>
+      </p:pic>
+    </p:spTree>
+    <p:extLst>
+      <p:ext uri="{BB962C8B-B14F-4D97-AF65-F5344CB8AC3E}">
+        <p14:creationId xmlns:p14="http://schemas.microsoft.com/office/powerpoint/2010/main" val="2994055623"/>
+      </p:ext>
+    </p:extLst>
+  </p:cSld>
+  <p:clrMapOvr>
+    <a:masterClrMapping/>
+  </p:clrMapOvr>
+</p:sld>
+</file>
+
+<file path=ppt/slides/slide15.xml><?xml version="1.0" encoding="utf-8"?>
+<p:sld xmlns:a="http://schemas.openxmlformats.org/drawingml/2006/main" xmlns:r="http://schemas.openxmlformats.org/officeDocument/2006/relationships" xmlns:p="http://schemas.openxmlformats.org/presentationml/2006/main">
+  <p:cSld>
+    <p:spTree>
+      <p:nvGrpSpPr>
+        <p:cNvPr id="1" name=""/>
+        <p:cNvGrpSpPr/>
+        <p:nvPr/>
+      </p:nvGrpSpPr>
+      <p:grpSpPr>
+        <a:xfrm>
+          <a:off x="0" y="0"/>
+          <a:ext cx="0" cy="0"/>
+          <a:chOff x="0" y="0"/>
+          <a:chExt cx="0" cy="0"/>
+        </a:xfrm>
+      </p:grpSpPr>
+      <p:pic>
+        <p:nvPicPr>
+          <p:cNvPr id="4" name="Content Placeholder 3"/>
+          <p:cNvPicPr>
+            <a:picLocks noGrp="1" noChangeAspect="1"/>
+          </p:cNvPicPr>
+          <p:nvPr>
+            <p:ph idx="1"/>
+          </p:nvPr>
+        </p:nvPicPr>
+        <p:blipFill rotWithShape="1">
+          <a:blip r:embed="rId2" cstate="print">
+            <a:extLst>
+              <a:ext uri="{28A0092B-C50C-407E-A947-70E740481C1C}">
+                <a14:useLocalDpi xmlns:a14="http://schemas.microsoft.com/office/drawing/2010/main" val="0"/>
+              </a:ext>
+            </a:extLst>
+          </a:blip>
+          <a:srcRect l="19412" r="19536"/>
+          <a:stretch/>
+        </p:blipFill>
+        <p:spPr>
+          <a:xfrm>
+            <a:off x="5074920" y="452718"/>
+            <a:ext cx="6675120" cy="6125813"/>
+          </a:xfrm>
+        </p:spPr>
+      </p:pic>
+      <p:sp>
+        <p:nvSpPr>
+          <p:cNvPr id="6" name="Content Placeholder 2"/>
+          <p:cNvSpPr txBox="1">
+            <a:spLocks/>
+          </p:cNvSpPr>
+          <p:nvPr/>
+        </p:nvSpPr>
+        <p:spPr>
+          <a:xfrm>
+            <a:off x="371793" y="1902791"/>
+            <a:ext cx="4556824" cy="4195481"/>
+          </a:xfrm>
+          <a:prstGeom prst="rect">
+            <a:avLst/>
+          </a:prstGeom>
+        </p:spPr>
+        <p:txBody>
+          <a:bodyPr vert="horz" lIns="91440" tIns="45720" rIns="91440" bIns="45720" rtlCol="0">
+            <a:normAutofit/>
+          </a:bodyPr>
+          <a:lstStyle>
+            <a:lvl1pPr marL="342900" indent="-342900" algn="l" defTabSz="457200" rtl="0" eaLnBrk="1" latinLnBrk="0" hangingPunct="1">
+              <a:spcBef>
+                <a:spcPts val="1000"/>
+              </a:spcBef>
+              <a:spcAft>
+                <a:spcPts val="0"/>
+              </a:spcAft>
+              <a:buClr>
+                <a:schemeClr val="accent1"/>
+              </a:buClr>
+              <a:buSzPct val="80000"/>
+              <a:buFont typeface="Wingdings 3" charset="2"/>
+              <a:buChar char=""/>
+              <a:defRPr sz="2000" b="0" i="0" kern="1200">
+                <a:solidFill>
+                  <a:schemeClr val="tx1"/>
+                </a:solidFill>
+                <a:latin typeface="+mj-lt"/>
+                <a:ea typeface="+mj-ea"/>
+                <a:cs typeface="+mj-cs"/>
+              </a:defRPr>
+            </a:lvl1pPr>
+            <a:lvl2pPr marL="742950" indent="-285750" algn="l" defTabSz="457200" rtl="0" eaLnBrk="1" latinLnBrk="0" hangingPunct="1">
+              <a:spcBef>
+                <a:spcPts val="1000"/>
+              </a:spcBef>
+              <a:spcAft>
+                <a:spcPts val="0"/>
+              </a:spcAft>
+              <a:buClr>
+                <a:schemeClr val="accent1"/>
+              </a:buClr>
+              <a:buSzPct val="80000"/>
+              <a:buFont typeface="Wingdings 3" charset="2"/>
+              <a:buChar char=""/>
+              <a:defRPr sz="1800" b="0" i="0" kern="1200">
+                <a:solidFill>
+                  <a:schemeClr val="tx1"/>
+                </a:solidFill>
+                <a:latin typeface="+mj-lt"/>
+                <a:ea typeface="+mj-ea"/>
+                <a:cs typeface="+mj-cs"/>
+              </a:defRPr>
+            </a:lvl2pPr>
+            <a:lvl3pPr marL="1143000" indent="-228600" algn="l" defTabSz="457200" rtl="0" eaLnBrk="1" latinLnBrk="0" hangingPunct="1">
+              <a:spcBef>
+                <a:spcPts val="1000"/>
+              </a:spcBef>
+              <a:spcAft>
+                <a:spcPts val="0"/>
+              </a:spcAft>
+              <a:buClr>
+                <a:schemeClr val="accent1"/>
+              </a:buClr>
+              <a:buSzPct val="80000"/>
+              <a:buFont typeface="Wingdings 3" charset="2"/>
+              <a:buChar char=""/>
+              <a:defRPr sz="1600" b="0" i="0" kern="1200">
+                <a:solidFill>
+                  <a:schemeClr val="tx1"/>
+                </a:solidFill>
+                <a:latin typeface="+mj-lt"/>
+                <a:ea typeface="+mj-ea"/>
+                <a:cs typeface="+mj-cs"/>
+              </a:defRPr>
+            </a:lvl3pPr>
+            <a:lvl4pPr marL="1600200" indent="-228600" algn="l" defTabSz="457200" rtl="0" eaLnBrk="1" latinLnBrk="0" hangingPunct="1">
+              <a:spcBef>
+                <a:spcPts val="1000"/>
+              </a:spcBef>
+              <a:spcAft>
+                <a:spcPts val="0"/>
+              </a:spcAft>
+              <a:buClr>
+                <a:schemeClr val="accent1"/>
+              </a:buClr>
+              <a:buSzPct val="80000"/>
+              <a:buFont typeface="Wingdings 3" charset="2"/>
+              <a:buChar char=""/>
+              <a:defRPr sz="1400" b="0" i="0" kern="1200">
+                <a:solidFill>
+                  <a:schemeClr val="tx1"/>
+                </a:solidFill>
+                <a:latin typeface="+mj-lt"/>
+                <a:ea typeface="+mj-ea"/>
+                <a:cs typeface="+mj-cs"/>
+              </a:defRPr>
+            </a:lvl4pPr>
+            <a:lvl5pPr marL="2057400" indent="-228600" algn="l" defTabSz="457200" rtl="0" eaLnBrk="1" latinLnBrk="0" hangingPunct="1">
+              <a:spcBef>
+                <a:spcPts val="1000"/>
+              </a:spcBef>
+              <a:spcAft>
+                <a:spcPts val="0"/>
+              </a:spcAft>
+              <a:buClr>
+                <a:schemeClr val="accent1"/>
+              </a:buClr>
+              <a:buSzPct val="80000"/>
+              <a:buFont typeface="Wingdings 3" charset="2"/>
+              <a:buChar char=""/>
+              <a:defRPr sz="1400" b="0" i="0" kern="1200">
+                <a:solidFill>
+                  <a:schemeClr val="tx1"/>
+                </a:solidFill>
+                <a:latin typeface="+mj-lt"/>
+                <a:ea typeface="+mj-ea"/>
+                <a:cs typeface="+mj-cs"/>
+              </a:defRPr>
+            </a:lvl5pPr>
+            <a:lvl6pPr marL="2514600" indent="-228600" algn="l" defTabSz="457200" rtl="0" eaLnBrk="1" latinLnBrk="0" hangingPunct="1">
+              <a:spcBef>
+                <a:spcPts val="1000"/>
+              </a:spcBef>
+              <a:spcAft>
+                <a:spcPts val="0"/>
+              </a:spcAft>
+              <a:buClr>
+                <a:schemeClr val="accent1"/>
+              </a:buClr>
+              <a:buSzPct val="80000"/>
+              <a:buFont typeface="Wingdings 3" charset="2"/>
+              <a:buChar char=""/>
+              <a:defRPr sz="1400" b="0" i="0" kern="1200">
+                <a:solidFill>
+                  <a:schemeClr val="tx1"/>
+                </a:solidFill>
+                <a:latin typeface="+mj-lt"/>
+                <a:ea typeface="+mj-ea"/>
+                <a:cs typeface="+mj-cs"/>
+              </a:defRPr>
+            </a:lvl6pPr>
+            <a:lvl7pPr marL="2971800" indent="-228600" algn="l" defTabSz="457200" rtl="0" eaLnBrk="1" latinLnBrk="0" hangingPunct="1">
+              <a:spcBef>
+                <a:spcPts val="1000"/>
+              </a:spcBef>
+              <a:spcAft>
+                <a:spcPts val="0"/>
+              </a:spcAft>
+              <a:buClr>
+                <a:schemeClr val="accent1"/>
+              </a:buClr>
+              <a:buSzPct val="80000"/>
+              <a:buFont typeface="Wingdings 3" charset="2"/>
+              <a:buChar char=""/>
+              <a:defRPr sz="1400" b="0" i="0" kern="1200">
+                <a:solidFill>
+                  <a:schemeClr val="tx1"/>
+                </a:solidFill>
+                <a:latin typeface="+mj-lt"/>
+                <a:ea typeface="+mj-ea"/>
+                <a:cs typeface="+mj-cs"/>
+              </a:defRPr>
+            </a:lvl7pPr>
+            <a:lvl8pPr marL="3429000" indent="-228600" algn="l" defTabSz="457200" rtl="0" eaLnBrk="1" latinLnBrk="0" hangingPunct="1">
+              <a:spcBef>
+                <a:spcPts val="1000"/>
+              </a:spcBef>
+              <a:spcAft>
+                <a:spcPts val="0"/>
+              </a:spcAft>
+              <a:buClr>
+                <a:schemeClr val="accent1"/>
+              </a:buClr>
+              <a:buSzPct val="80000"/>
+              <a:buFont typeface="Wingdings 3" charset="2"/>
+              <a:buChar char=""/>
+              <a:defRPr sz="1400" b="0" i="0" kern="1200">
+                <a:solidFill>
+                  <a:schemeClr val="tx1"/>
+                </a:solidFill>
+                <a:latin typeface="+mj-lt"/>
+                <a:ea typeface="+mj-ea"/>
+                <a:cs typeface="+mj-cs"/>
+              </a:defRPr>
+            </a:lvl8pPr>
+            <a:lvl9pPr marL="3886200" indent="-228600" algn="l" defTabSz="457200" rtl="0" eaLnBrk="1" latinLnBrk="0" hangingPunct="1">
+              <a:spcBef>
+                <a:spcPts val="1000"/>
+              </a:spcBef>
+              <a:spcAft>
+                <a:spcPts val="0"/>
+              </a:spcAft>
+              <a:buClr>
+                <a:schemeClr val="accent1"/>
+              </a:buClr>
+              <a:buSzPct val="80000"/>
+              <a:buFont typeface="Wingdings 3" charset="2"/>
+              <a:buChar char=""/>
+              <a:defRPr sz="1400" b="0" i="0" kern="1200">
+                <a:solidFill>
+                  <a:schemeClr val="tx1"/>
+                </a:solidFill>
+                <a:latin typeface="+mj-lt"/>
+                <a:ea typeface="+mj-ea"/>
+                <a:cs typeface="+mj-cs"/>
+              </a:defRPr>
+            </a:lvl9pPr>
+          </a:lstStyle>
+          <a:p>
+            <a:r>
+              <a:rPr lang="en-US" dirty="0" smtClean="0"/>
+              <a:t>A* Example of admissible heuristic that isn’t perfect</a:t>
+            </a:r>
+          </a:p>
+          <a:p>
+            <a:endParaRPr lang="en-US" dirty="0" smtClean="0"/>
+          </a:p>
+          <a:p>
+            <a:r>
+              <a:rPr lang="en-US" dirty="0" smtClean="0"/>
+              <a:t>Rounded up to nearest value divisible by 5</a:t>
+            </a:r>
+          </a:p>
+          <a:p>
+            <a:endParaRPr lang="en-US" dirty="0"/>
+          </a:p>
+          <a:p>
+            <a:r>
+              <a:rPr lang="en-US" dirty="0" smtClean="0"/>
+              <a:t>Took heuristic from nodes physically closer to goal</a:t>
+            </a:r>
+            <a:endParaRPr lang="en-US" dirty="0"/>
+          </a:p>
+        </p:txBody>
+      </p:sp>
+      <p:sp>
+        <p:nvSpPr>
+          <p:cNvPr id="7" name="Title 6"/>
+          <p:cNvSpPr>
+            <a:spLocks noGrp="1"/>
+          </p:cNvSpPr>
+          <p:nvPr>
+            <p:ph type="title"/>
+          </p:nvPr>
+        </p:nvSpPr>
+        <p:spPr/>
+        <p:txBody>
+          <a:bodyPr/>
+          <a:lstStyle/>
+          <a:p>
+            <a:r>
+              <a:rPr lang="en-US" dirty="0" smtClean="0"/>
+              <a:t>A *</a:t>
+            </a:r>
+            <a:br>
+              <a:rPr lang="en-US" dirty="0" smtClean="0"/>
+            </a:br>
+            <a:r>
+              <a:rPr lang="en-US" dirty="0" smtClean="0"/>
+              <a:t>Ex.</a:t>
+            </a:r>
+            <a:endParaRPr lang="en-US" dirty="0"/>
+          </a:p>
+        </p:txBody>
+      </p:sp>
+      <p:sp>
+        <p:nvSpPr>
+          <p:cNvPr id="13" name="TextBox 12"/>
+          <p:cNvSpPr txBox="1"/>
+          <p:nvPr/>
+        </p:nvSpPr>
+        <p:spPr>
+          <a:xfrm>
+            <a:off x="10808208" y="4325112"/>
+            <a:ext cx="441146" cy="369332"/>
+          </a:xfrm>
+          <a:prstGeom prst="rect">
+            <a:avLst/>
+          </a:prstGeom>
+          <a:noFill/>
+        </p:spPr>
+        <p:txBody>
+          <a:bodyPr wrap="none" rtlCol="0">
+            <a:spAutoFit/>
+          </a:bodyPr>
+          <a:lstStyle/>
+          <a:p>
+            <a:r>
+              <a:rPr lang="en-US" dirty="0" smtClean="0"/>
+              <a:t>15</a:t>
+            </a:r>
+            <a:endParaRPr lang="en-US" dirty="0"/>
+          </a:p>
+        </p:txBody>
+      </p:sp>
+    </p:spTree>
+    <p:extLst>
+      <p:ext uri="{BB962C8B-B14F-4D97-AF65-F5344CB8AC3E}">
+        <p14:creationId xmlns:p14="http://schemas.microsoft.com/office/powerpoint/2010/main" val="871122631"/>
+      </p:ext>
+    </p:extLst>
+  </p:cSld>
+  <p:clrMapOvr>
+    <a:masterClrMapping/>
+  </p:clrMapOvr>
+</p:sld>
+</file>
+
+<file path=ppt/slides/slide16.xml><?xml version="1.0" encoding="utf-8"?>
+<p:sld xmlns:a="http://schemas.openxmlformats.org/drawingml/2006/main" xmlns:r="http://schemas.openxmlformats.org/officeDocument/2006/relationships" xmlns:p="http://schemas.openxmlformats.org/presentationml/2006/main">
+  <p:cSld>
+    <p:spTree>
+      <p:nvGrpSpPr>
+        <p:cNvPr id="1" name=""/>
+        <p:cNvGrpSpPr/>
+        <p:nvPr/>
+      </p:nvGrpSpPr>
+      <p:grpSpPr>
+        <a:xfrm>
+          <a:off x="0" y="0"/>
+          <a:ext cx="0" cy="0"/>
+          <a:chOff x="0" y="0"/>
+          <a:chExt cx="0" cy="0"/>
+        </a:xfrm>
+      </p:grpSpPr>
+      <p:sp>
+        <p:nvSpPr>
+          <p:cNvPr id="2" name="Title 1"/>
+          <p:cNvSpPr>
+            <a:spLocks noGrp="1"/>
+          </p:cNvSpPr>
+          <p:nvPr>
+            <p:ph type="title"/>
+          </p:nvPr>
+        </p:nvSpPr>
+        <p:spPr/>
+        <p:txBody>
+          <a:bodyPr/>
+          <a:lstStyle/>
+          <a:p>
+            <a:r>
+              <a:rPr lang="en-US" dirty="0" smtClean="0"/>
+              <a:t>Short Example</a:t>
+            </a:r>
+            <a:endParaRPr lang="en-US" dirty="0"/>
+          </a:p>
+        </p:txBody>
+      </p:sp>
+      <p:sp>
+        <p:nvSpPr>
+          <p:cNvPr id="3" name="Content Placeholder 2"/>
+          <p:cNvSpPr>
+            <a:spLocks noGrp="1"/>
+          </p:cNvSpPr>
+          <p:nvPr>
+            <p:ph idx="1"/>
+          </p:nvPr>
+        </p:nvSpPr>
+        <p:spPr/>
+        <p:txBody>
+          <a:bodyPr/>
+          <a:lstStyle/>
+          <a:p>
+            <a:r>
+              <a:rPr lang="en-US" dirty="0" smtClean="0"/>
+              <a:t>Dijkstra’s Algorithm would be too slow, and you can’t tell exact from approximate</a:t>
+            </a:r>
+          </a:p>
+          <a:p>
+            <a:endParaRPr lang="en-US" dirty="0"/>
+          </a:p>
+          <a:p>
+            <a:r>
+              <a:rPr lang="en-US"/>
+              <a:t>https://www.youtube.com/watch?v=DlkMs4ZHHr8</a:t>
+            </a:r>
+            <a:endParaRPr lang="en-US" dirty="0"/>
+          </a:p>
+        </p:txBody>
+      </p:sp>
+    </p:spTree>
+    <p:extLst>
+      <p:ext uri="{BB962C8B-B14F-4D97-AF65-F5344CB8AC3E}">
+        <p14:creationId xmlns:p14="http://schemas.microsoft.com/office/powerpoint/2010/main" val="3448773120"/>
+      </p:ext>
+    </p:extLst>
+  </p:cSld>
+  <p:clrMapOvr>
+    <a:masterClrMapping/>
+  </p:clrMapOvr>
+</p:sld>
+</file>
+
+<file path=ppt/slides/slide2.xml><?xml version="1.0" encoding="utf-8"?>
+<p:sld xmlns:a="http://schemas.openxmlformats.org/drawingml/2006/main" xmlns:r="http://schemas.openxmlformats.org/officeDocument/2006/relationships" xmlns:p="http://schemas.openxmlformats.org/presentationml/2006/main">
+  <p:cSld>
+    <p:spTree>
+      <p:nvGrpSpPr>
+        <p:cNvPr id="1" name=""/>
+        <p:cNvGrpSpPr/>
+        <p:nvPr/>
+      </p:nvGrpSpPr>
+      <p:grpSpPr>
+        <a:xfrm>
+          <a:off x="0" y="0"/>
+          <a:ext cx="0" cy="0"/>
+          <a:chOff x="0" y="0"/>
+          <a:chExt cx="0" cy="0"/>
+        </a:xfrm>
+      </p:grpSpPr>
+      <p:sp>
+        <p:nvSpPr>
+          <p:cNvPr id="2" name="Title 1"/>
+          <p:cNvSpPr>
+            <a:spLocks noGrp="1"/>
+          </p:cNvSpPr>
+          <p:nvPr>
+            <p:ph type="title"/>
+          </p:nvPr>
+        </p:nvSpPr>
+        <p:spPr/>
+        <p:txBody>
+          <a:bodyPr/>
+          <a:lstStyle/>
+          <a:p>
+            <a:r>
+              <a:rPr lang="en-US" dirty="0" smtClean="0"/>
+              <a:t>Quick note on</a:t>
+            </a:r>
+            <a:endParaRPr lang="en-US" dirty="0"/>
+          </a:p>
+        </p:txBody>
+      </p:sp>
+      <p:sp>
+        <p:nvSpPr>
+          <p:cNvPr id="3" name="Content Placeholder 2"/>
+          <p:cNvSpPr>
+            <a:spLocks noGrp="1"/>
+          </p:cNvSpPr>
+          <p:nvPr>
+            <p:ph idx="1"/>
+          </p:nvPr>
+        </p:nvSpPr>
+        <p:spPr/>
+        <p:txBody>
+          <a:bodyPr/>
+          <a:lstStyle/>
+          <a:p>
+            <a:r>
+              <a:rPr lang="en-US" dirty="0" smtClean="0"/>
+              <a:t>Space Complexity</a:t>
+            </a:r>
+          </a:p>
+          <a:p>
+            <a:pPr lvl="1"/>
+            <a:r>
+              <a:rPr lang="en-US" dirty="0" smtClean="0"/>
+              <a:t>Amount of memory an algorithm uses based on set size</a:t>
+            </a:r>
+          </a:p>
+          <a:p>
+            <a:endParaRPr lang="en-US" dirty="0" smtClean="0"/>
+          </a:p>
+          <a:p>
+            <a:r>
+              <a:rPr lang="en-US" dirty="0" smtClean="0"/>
+              <a:t>Time Complexity</a:t>
+            </a:r>
+          </a:p>
+          <a:p>
+            <a:pPr lvl="1"/>
+            <a:r>
+              <a:rPr lang="en-US" dirty="0" smtClean="0"/>
+              <a:t>Amount of time an algorithm takes from start to finish</a:t>
+            </a:r>
+          </a:p>
+          <a:p>
+            <a:endParaRPr lang="en-US" dirty="0" smtClean="0"/>
+          </a:p>
+          <a:p>
+            <a:r>
+              <a:rPr lang="en-US" dirty="0" smtClean="0"/>
+              <a:t>Big-O Notation</a:t>
+            </a:r>
+          </a:p>
+          <a:p>
+            <a:pPr lvl="1"/>
+            <a:r>
+              <a:rPr lang="en-US" dirty="0" smtClean="0"/>
+              <a:t>Worst case time complexity excluding coefficients and lower order terms</a:t>
+            </a:r>
+            <a:endParaRPr lang="en-US" dirty="0"/>
+          </a:p>
+        </p:txBody>
+      </p:sp>
+    </p:spTree>
+    <p:extLst>
+      <p:ext uri="{BB962C8B-B14F-4D97-AF65-F5344CB8AC3E}">
+        <p14:creationId xmlns:p14="http://schemas.microsoft.com/office/powerpoint/2010/main" val="697602684"/>
+      </p:ext>
+    </p:extLst>
+  </p:cSld>
+  <p:clrMapOvr>
+    <a:masterClrMapping/>
+  </p:clrMapOvr>
+</p:sld>
+</file>
+
+<file path=ppt/slides/slide3.xml><?xml version="1.0" encoding="utf-8"?>
+<p:sld xmlns:a="http://schemas.openxmlformats.org/drawingml/2006/main" xmlns:r="http://schemas.openxmlformats.org/officeDocument/2006/relationships" xmlns:p="http://schemas.openxmlformats.org/presentationml/2006/main">
+  <p:cSld>
+    <p:spTree>
+      <p:nvGrpSpPr>
+        <p:cNvPr id="1" name=""/>
+        <p:cNvGrpSpPr/>
+        <p:nvPr/>
+      </p:nvGrpSpPr>
+      <p:grpSpPr>
+        <a:xfrm>
+          <a:off x="0" y="0"/>
+          <a:ext cx="0" cy="0"/>
+          <a:chOff x="0" y="0"/>
+          <a:chExt cx="0" cy="0"/>
+        </a:xfrm>
+      </p:grpSpPr>
+      <p:sp>
+        <p:nvSpPr>
+          <p:cNvPr id="2" name="Title 1"/>
+          <p:cNvSpPr>
+            <a:spLocks noGrp="1"/>
+          </p:cNvSpPr>
+          <p:nvPr>
+            <p:ph type="title"/>
+          </p:nvPr>
+        </p:nvSpPr>
+        <p:spPr/>
+        <p:txBody>
+          <a:bodyPr/>
+          <a:lstStyle/>
+          <a:p>
+            <a:r>
+              <a:rPr lang="en-US" dirty="0" smtClean="0"/>
+              <a:t>Big-O</a:t>
+            </a:r>
+            <a:endParaRPr lang="en-US" dirty="0"/>
+          </a:p>
+        </p:txBody>
+      </p:sp>
+      <p:sp>
+        <p:nvSpPr>
+          <p:cNvPr id="3" name="Content Placeholder 2"/>
+          <p:cNvSpPr>
+            <a:spLocks noGrp="1"/>
+          </p:cNvSpPr>
+          <p:nvPr>
+            <p:ph idx="1"/>
+          </p:nvPr>
+        </p:nvSpPr>
+        <p:spPr>
+          <a:xfrm>
+            <a:off x="1103312" y="1389888"/>
+            <a:ext cx="8946541" cy="4858511"/>
+          </a:xfrm>
+        </p:spPr>
+        <p:txBody>
+          <a:bodyPr/>
+          <a:lstStyle/>
+          <a:p>
+            <a:r>
+              <a:rPr lang="en-US" dirty="0" smtClean="0"/>
+              <a:t>Ex. Where n is the size of a set</a:t>
+            </a:r>
+          </a:p>
+          <a:p>
+            <a:endParaRPr lang="en-US" dirty="0" smtClean="0"/>
+          </a:p>
+          <a:p>
+            <a:r>
+              <a:rPr lang="en-US" dirty="0" smtClean="0"/>
+              <a:t>Imagine an algorithm that takes 5n</a:t>
+            </a:r>
+            <a:r>
+              <a:rPr lang="en-US" baseline="30000" dirty="0" smtClean="0"/>
+              <a:t>3</a:t>
+            </a:r>
+            <a:r>
+              <a:rPr lang="en-US" dirty="0" smtClean="0"/>
+              <a:t> + 3n time to run.</a:t>
+            </a:r>
+          </a:p>
+          <a:p>
+            <a:pPr lvl="1"/>
+            <a:r>
+              <a:rPr lang="en-US" dirty="0" smtClean="0"/>
+              <a:t>1: 8 units of “time”/computations</a:t>
+            </a:r>
+          </a:p>
+          <a:p>
+            <a:pPr lvl="1"/>
+            <a:r>
+              <a:rPr lang="en-US" dirty="0" smtClean="0"/>
+              <a:t>2: 52</a:t>
+            </a:r>
+          </a:p>
+          <a:p>
+            <a:pPr lvl="1"/>
+            <a:r>
+              <a:rPr lang="en-US" dirty="0" smtClean="0"/>
+              <a:t>3: 144</a:t>
+            </a:r>
+          </a:p>
+          <a:p>
+            <a:pPr lvl="1"/>
+            <a:r>
+              <a:rPr lang="en-US" dirty="0" smtClean="0"/>
+              <a:t>…</a:t>
+            </a:r>
+          </a:p>
+          <a:p>
+            <a:r>
+              <a:rPr lang="en-US" dirty="0" smtClean="0"/>
+              <a:t>We can safely say as n increases, n</a:t>
+            </a:r>
+            <a:r>
+              <a:rPr lang="en-US" baseline="30000" dirty="0" smtClean="0"/>
+              <a:t>3</a:t>
+            </a:r>
+            <a:r>
+              <a:rPr lang="en-US" dirty="0" smtClean="0"/>
+              <a:t> has the most effect</a:t>
+            </a:r>
+          </a:p>
+          <a:p>
+            <a:endParaRPr lang="en-US" dirty="0"/>
+          </a:p>
+          <a:p>
+            <a:r>
+              <a:rPr lang="en-US" dirty="0" smtClean="0"/>
+              <a:t>Therefore, big-O of </a:t>
+            </a:r>
+            <a:r>
+              <a:rPr lang="en-US" dirty="0"/>
+              <a:t>5n</a:t>
+            </a:r>
+            <a:r>
+              <a:rPr lang="en-US" baseline="30000" dirty="0"/>
+              <a:t>3</a:t>
+            </a:r>
+            <a:r>
+              <a:rPr lang="en-US" dirty="0"/>
+              <a:t> + 3n </a:t>
+            </a:r>
+            <a:r>
+              <a:rPr lang="en-US" dirty="0" smtClean="0"/>
+              <a:t>is O(n</a:t>
+            </a:r>
+            <a:r>
+              <a:rPr lang="en-US" baseline="30000" dirty="0" smtClean="0"/>
+              <a:t>3</a:t>
+            </a:r>
+            <a:r>
+              <a:rPr lang="en-US" dirty="0" smtClean="0"/>
+              <a:t>)</a:t>
+            </a:r>
+          </a:p>
+        </p:txBody>
+      </p:sp>
+    </p:spTree>
+    <p:extLst>
+      <p:ext uri="{BB962C8B-B14F-4D97-AF65-F5344CB8AC3E}">
+        <p14:creationId xmlns:p14="http://schemas.microsoft.com/office/powerpoint/2010/main" val="3131815802"/>
+      </p:ext>
+    </p:extLst>
+  </p:cSld>
+  <p:clrMapOvr>
+    <a:masterClrMapping/>
+  </p:clrMapOvr>
+</p:sld>
+</file>
+
+<file path=ppt/slides/slide4.xml><?xml version="1.0" encoding="utf-8"?>
+<p:sld xmlns:a="http://schemas.openxmlformats.org/drawingml/2006/main" xmlns:r="http://schemas.openxmlformats.org/officeDocument/2006/relationships" xmlns:p="http://schemas.openxmlformats.org/presentationml/2006/main">
+  <p:cSld>
+    <p:spTree>
+      <p:nvGrpSpPr>
+        <p:cNvPr id="1" name=""/>
+        <p:cNvGrpSpPr/>
+        <p:nvPr/>
+      </p:nvGrpSpPr>
+      <p:grpSpPr>
+        <a:xfrm>
+          <a:off x="0" y="0"/>
+          <a:ext cx="0" cy="0"/>
+          <a:chOff x="0" y="0"/>
+          <a:chExt cx="0" cy="0"/>
+        </a:xfrm>
+      </p:grpSpPr>
+      <p:sp>
+        <p:nvSpPr>
+          <p:cNvPr id="2" name="Title 1"/>
+          <p:cNvSpPr>
+            <a:spLocks noGrp="1"/>
+          </p:cNvSpPr>
+          <p:nvPr>
+            <p:ph type="title"/>
+          </p:nvPr>
+        </p:nvSpPr>
+        <p:spPr/>
+        <p:txBody>
+          <a:bodyPr/>
+          <a:lstStyle/>
+          <a:p>
+            <a:r>
+              <a:rPr lang="en-US" dirty="0" smtClean="0"/>
+              <a:t>Dijkstra’s Pathfinding Algorithm</a:t>
+            </a:r>
+            <a:endParaRPr lang="en-US" dirty="0"/>
+          </a:p>
+        </p:txBody>
+      </p:sp>
+      <p:sp>
+        <p:nvSpPr>
+          <p:cNvPr id="3" name="Content Placeholder 2"/>
+          <p:cNvSpPr>
+            <a:spLocks noGrp="1"/>
+          </p:cNvSpPr>
+          <p:nvPr>
+            <p:ph idx="1"/>
+          </p:nvPr>
+        </p:nvSpPr>
+        <p:spPr/>
+        <p:txBody>
+          <a:bodyPr>
+            <a:normAutofit lnSpcReduction="10000"/>
+          </a:bodyPr>
+          <a:lstStyle/>
+          <a:p>
+            <a:r>
+              <a:rPr lang="en-US" dirty="0" smtClean="0"/>
+              <a:t>Uniform Cost Search</a:t>
+            </a:r>
+          </a:p>
+          <a:p>
+            <a:endParaRPr lang="en-US" dirty="0" smtClean="0"/>
+          </a:p>
+          <a:p>
+            <a:r>
+              <a:rPr lang="en-US" dirty="0" smtClean="0"/>
+              <a:t>Space complexity</a:t>
+            </a:r>
+          </a:p>
+          <a:p>
+            <a:pPr lvl="1"/>
+            <a:r>
+              <a:rPr lang="en-US" dirty="0" smtClean="0"/>
+              <a:t>O(|V|</a:t>
+            </a:r>
+            <a:r>
+              <a:rPr lang="en-US" baseline="30000" dirty="0" smtClean="0"/>
+              <a:t>2</a:t>
+            </a:r>
+            <a:r>
+              <a:rPr lang="en-US" dirty="0" smtClean="0"/>
+              <a:t>) </a:t>
+            </a:r>
+          </a:p>
+          <a:p>
+            <a:pPr lvl="2"/>
+            <a:r>
+              <a:rPr lang="en-US" dirty="0" smtClean="0"/>
+              <a:t>Keep track of all possible paths</a:t>
+            </a:r>
+            <a:endParaRPr lang="en-US" dirty="0"/>
+          </a:p>
+          <a:p>
+            <a:endParaRPr lang="en-US" dirty="0"/>
+          </a:p>
+          <a:p>
+            <a:r>
+              <a:rPr lang="en-US" dirty="0" smtClean="0"/>
+              <a:t>Time complexity </a:t>
+            </a:r>
+          </a:p>
+          <a:p>
+            <a:pPr lvl="1"/>
+            <a:r>
+              <a:rPr lang="en-US" dirty="0" smtClean="0"/>
+              <a:t>If |E| &gt; |V|</a:t>
+            </a:r>
+            <a:r>
+              <a:rPr lang="en-US" baseline="30000" dirty="0" smtClean="0"/>
+              <a:t>2</a:t>
+            </a:r>
+            <a:r>
+              <a:rPr lang="en-US" dirty="0" smtClean="0"/>
+              <a:t> , then O(|V|</a:t>
+            </a:r>
+            <a:r>
+              <a:rPr lang="en-US" baseline="30000" dirty="0" smtClean="0"/>
+              <a:t>2</a:t>
+            </a:r>
+            <a:r>
+              <a:rPr lang="en-US" dirty="0"/>
+              <a:t>) </a:t>
+            </a:r>
+            <a:r>
+              <a:rPr lang="en-US" dirty="0" smtClean="0"/>
+              <a:t> </a:t>
+            </a:r>
+          </a:p>
+          <a:p>
+            <a:pPr lvl="2"/>
+            <a:r>
+              <a:rPr lang="en-US" dirty="0" smtClean="0"/>
+              <a:t>Every node was visited and all possible paths recorded</a:t>
+            </a:r>
+            <a:endParaRPr lang="en-US" dirty="0" smtClean="0"/>
+          </a:p>
+          <a:p>
+            <a:pPr lvl="1"/>
+            <a:r>
+              <a:rPr lang="en-US" dirty="0" smtClean="0"/>
+              <a:t>If |E| &lt; </a:t>
+            </a:r>
+            <a:r>
+              <a:rPr lang="en-US" dirty="0"/>
+              <a:t>|V|</a:t>
+            </a:r>
+            <a:r>
+              <a:rPr lang="en-US" baseline="30000" dirty="0"/>
+              <a:t>2</a:t>
+            </a:r>
+            <a:r>
+              <a:rPr lang="en-US" dirty="0"/>
+              <a:t> , then </a:t>
+            </a:r>
+            <a:r>
+              <a:rPr lang="en-US" dirty="0" smtClean="0"/>
+              <a:t>O(|</a:t>
+            </a:r>
+            <a:r>
+              <a:rPr lang="en-US" dirty="0" err="1" smtClean="0"/>
+              <a:t>E|log</a:t>
+            </a:r>
+            <a:r>
+              <a:rPr lang="en-US" dirty="0" smtClean="0"/>
+              <a:t>(|V|)) </a:t>
+            </a:r>
+            <a:endParaRPr lang="en-US" dirty="0"/>
+          </a:p>
+          <a:p>
+            <a:pPr lvl="2"/>
+            <a:r>
+              <a:rPr lang="en-US" dirty="0" smtClean="0"/>
+              <a:t>Removing minimum node, adding new node, calculating shortest edge</a:t>
+            </a:r>
+          </a:p>
+          <a:p>
+            <a:pPr lvl="2"/>
+            <a:endParaRPr lang="en-US" dirty="0" smtClean="0"/>
+          </a:p>
+          <a:p>
+            <a:pPr lvl="1"/>
+            <a:endParaRPr lang="en-US" dirty="0"/>
+          </a:p>
+          <a:p>
+            <a:pPr lvl="1"/>
+            <a:endParaRPr lang="en-US" dirty="0" smtClean="0"/>
+          </a:p>
+        </p:txBody>
+      </p:sp>
+      <p:sp>
+        <p:nvSpPr>
+          <p:cNvPr id="4" name="TextBox 3"/>
+          <p:cNvSpPr txBox="1"/>
+          <p:nvPr/>
+        </p:nvSpPr>
+        <p:spPr>
+          <a:xfrm>
+            <a:off x="6664525" y="6399085"/>
+            <a:ext cx="5527475" cy="646331"/>
+          </a:xfrm>
+          <a:prstGeom prst="rect">
+            <a:avLst/>
+          </a:prstGeom>
+          <a:noFill/>
+        </p:spPr>
+        <p:txBody>
+          <a:bodyPr wrap="none" rtlCol="0">
+            <a:spAutoFit/>
+          </a:bodyPr>
+          <a:lstStyle/>
+          <a:p>
+            <a:r>
+              <a:rPr lang="en-US" sz="1200" dirty="0" smtClean="0">
+                <a:hlinkClick r:id="rId2"/>
+              </a:rPr>
+              <a:t>http://www-m3.ma.tum.de/foswiki/pub/MN0506/WebHome/dijkstra.pdf</a:t>
+            </a:r>
+            <a:endParaRPr lang="en-US" sz="1200" dirty="0" smtClean="0"/>
+          </a:p>
+          <a:p>
+            <a:r>
+              <a:rPr lang="en-US" sz="1200" dirty="0" smtClean="0">
+                <a:hlinkClick r:id="rId3"/>
+              </a:rPr>
+              <a:t>http://matwbn.icm.edu.pl/ksiazki/cc/cc35/cc3536.pdf</a:t>
+            </a:r>
+            <a:endParaRPr lang="en-US" sz="1200" dirty="0" smtClean="0"/>
+          </a:p>
+          <a:p>
+            <a:endParaRPr lang="en-US" sz="1200" dirty="0"/>
+          </a:p>
+        </p:txBody>
+      </p:sp>
+    </p:spTree>
+    <p:extLst>
+      <p:ext uri="{BB962C8B-B14F-4D97-AF65-F5344CB8AC3E}">
+        <p14:creationId xmlns:p14="http://schemas.microsoft.com/office/powerpoint/2010/main" val="1287779507"/>
+      </p:ext>
+    </p:extLst>
+  </p:cSld>
+  <p:clrMapOvr>
+    <a:masterClrMapping/>
+  </p:clrMapOvr>
+  <p:timing>
+    <p:tnLst>
+      <p:par>
+        <p:cTn id="1" dur="indefinite" restart="never" nodeType="tmRoot"/>
+      </p:par>
+    </p:tnLst>
+  </p:timing>
+</p:sld>
+</file>
+
+<file path=ppt/slides/slide5.xml><?xml version="1.0" encoding="utf-8"?>
+<p:sld xmlns:a="http://schemas.openxmlformats.org/drawingml/2006/main" xmlns:r="http://schemas.openxmlformats.org/officeDocument/2006/relationships" xmlns:p="http://schemas.openxmlformats.org/presentationml/2006/main">
+  <p:cSld>
+    <p:spTree>
+      <p:nvGrpSpPr>
+        <p:cNvPr id="1" name=""/>
+        <p:cNvGrpSpPr/>
+        <p:nvPr/>
+      </p:nvGrpSpPr>
+      <p:grpSpPr>
+        <a:xfrm>
+          <a:off x="0" y="0"/>
+          <a:ext cx="0" cy="0"/>
+          <a:chOff x="0" y="0"/>
+          <a:chExt cx="0" cy="0"/>
+        </a:xfrm>
+      </p:grpSpPr>
+      <p:sp>
+        <p:nvSpPr>
+          <p:cNvPr id="2" name="Title 1"/>
+          <p:cNvSpPr>
+            <a:spLocks noGrp="1"/>
+          </p:cNvSpPr>
+          <p:nvPr>
+            <p:ph type="title"/>
+          </p:nvPr>
+        </p:nvSpPr>
+        <p:spPr/>
+        <p:txBody>
+          <a:bodyPr/>
+          <a:lstStyle/>
+          <a:p>
+            <a:r>
+              <a:rPr lang="en-US" dirty="0" smtClean="0"/>
+              <a:t>When |E| &lt; |V|</a:t>
+            </a:r>
+            <a:r>
+              <a:rPr lang="en-US" sz="4400" baseline="30000" dirty="0" smtClean="0"/>
+              <a:t>2</a:t>
+            </a:r>
+            <a:endParaRPr lang="en-US" dirty="0"/>
+          </a:p>
+        </p:txBody>
+      </p:sp>
+      <p:sp>
+        <p:nvSpPr>
+          <p:cNvPr id="3" name="Content Placeholder 2"/>
+          <p:cNvSpPr>
+            <a:spLocks noGrp="1"/>
+          </p:cNvSpPr>
+          <p:nvPr>
+            <p:ph idx="1"/>
+          </p:nvPr>
+        </p:nvSpPr>
+        <p:spPr/>
+        <p:txBody>
+          <a:bodyPr/>
+          <a:lstStyle/>
+          <a:p>
+            <a:r>
+              <a:rPr lang="en-US" dirty="0" smtClean="0"/>
+              <a:t>Each vertex can be connected to V-1 vertices, let’s call each </a:t>
+            </a:r>
+            <a:r>
+              <a:rPr lang="en-US" dirty="0" err="1" smtClean="0"/>
+              <a:t>E</a:t>
+            </a:r>
+            <a:r>
+              <a:rPr lang="en-US" baseline="-25000" dirty="0" err="1" smtClean="0"/>
+              <a:t>i</a:t>
+            </a:r>
+            <a:endParaRPr lang="en-US" dirty="0" smtClean="0"/>
+          </a:p>
+          <a:p>
+            <a:r>
+              <a:rPr lang="en-US" dirty="0" smtClean="0"/>
+              <a:t>Updating each vertex’s weight in (common heap) implementation takes O(log(V))</a:t>
+            </a:r>
+          </a:p>
+          <a:p>
+            <a:endParaRPr lang="en-US" dirty="0" smtClean="0"/>
+          </a:p>
+          <a:p>
+            <a:r>
+              <a:rPr lang="en-US" dirty="0" smtClean="0"/>
+              <a:t>There are E</a:t>
+            </a:r>
+            <a:r>
+              <a:rPr lang="en-US" baseline="-25000" dirty="0" smtClean="0"/>
+              <a:t>1</a:t>
+            </a:r>
+            <a:r>
+              <a:rPr lang="en-US" dirty="0" smtClean="0"/>
+              <a:t> -&gt; </a:t>
+            </a:r>
+            <a:r>
+              <a:rPr lang="en-US" dirty="0" err="1" smtClean="0"/>
+              <a:t>E</a:t>
+            </a:r>
+            <a:r>
+              <a:rPr lang="en-US" baseline="-25000" dirty="0" err="1" smtClean="0"/>
+              <a:t>v</a:t>
+            </a:r>
+            <a:r>
+              <a:rPr lang="en-US" baseline="-25000" dirty="0"/>
+              <a:t> </a:t>
+            </a:r>
+            <a:r>
+              <a:rPr lang="en-US" dirty="0" smtClean="0"/>
+              <a:t> edges group, we’ll generalize as E</a:t>
+            </a:r>
+          </a:p>
+          <a:p>
+            <a:endParaRPr lang="en-US" dirty="0"/>
+          </a:p>
+          <a:p>
+            <a:r>
+              <a:rPr lang="en-US" dirty="0" smtClean="0"/>
+              <a:t>So, O(E*log(V))</a:t>
+            </a:r>
+          </a:p>
+          <a:p>
+            <a:endParaRPr lang="en-US" dirty="0"/>
+          </a:p>
+        </p:txBody>
+      </p:sp>
+    </p:spTree>
+    <p:extLst>
+      <p:ext uri="{BB962C8B-B14F-4D97-AF65-F5344CB8AC3E}">
+        <p14:creationId xmlns:p14="http://schemas.microsoft.com/office/powerpoint/2010/main" val="1891613384"/>
+      </p:ext>
+    </p:extLst>
+  </p:cSld>
+  <p:clrMapOvr>
+    <a:masterClrMapping/>
+  </p:clrMapOvr>
+</p:sld>
+</file>
+
+<file path=ppt/slides/slide6.xml><?xml version="1.0" encoding="utf-8"?>
+<p:sld xmlns:a="http://schemas.openxmlformats.org/drawingml/2006/main" xmlns:r="http://schemas.openxmlformats.org/officeDocument/2006/relationships" xmlns:p="http://schemas.openxmlformats.org/presentationml/2006/main">
+  <p:cSld>
+    <p:spTree>
+      <p:nvGrpSpPr>
+        <p:cNvPr id="1" name=""/>
+        <p:cNvGrpSpPr/>
+        <p:nvPr/>
+      </p:nvGrpSpPr>
+      <p:grpSpPr>
+        <a:xfrm>
+          <a:off x="0" y="0"/>
+          <a:ext cx="0" cy="0"/>
+          <a:chOff x="0" y="0"/>
+          <a:chExt cx="0" cy="0"/>
+        </a:xfrm>
+      </p:grpSpPr>
+      <p:sp>
+        <p:nvSpPr>
+          <p:cNvPr id="2" name="Title 1"/>
+          <p:cNvSpPr>
+            <a:spLocks noGrp="1"/>
+          </p:cNvSpPr>
+          <p:nvPr>
+            <p:ph type="title"/>
+          </p:nvPr>
+        </p:nvSpPr>
+        <p:spPr/>
+        <p:txBody>
+          <a:bodyPr/>
+          <a:lstStyle/>
+          <a:p>
+            <a:r>
+              <a:rPr lang="en-US" dirty="0" smtClean="0"/>
+              <a:t>A* Pathfinding Heuristic</a:t>
+            </a:r>
+            <a:endParaRPr lang="en-US" dirty="0"/>
+          </a:p>
+        </p:txBody>
+      </p:sp>
+      <p:sp>
+        <p:nvSpPr>
+          <p:cNvPr id="3" name="Content Placeholder 2"/>
+          <p:cNvSpPr>
+            <a:spLocks noGrp="1"/>
+          </p:cNvSpPr>
+          <p:nvPr>
+            <p:ph idx="1"/>
+          </p:nvPr>
+        </p:nvSpPr>
+        <p:spPr/>
+        <p:txBody>
+          <a:bodyPr/>
+          <a:lstStyle/>
+          <a:p>
+            <a:r>
+              <a:rPr lang="en-US" dirty="0" smtClean="0"/>
+              <a:t>Guided Breadth first search</a:t>
+            </a:r>
+          </a:p>
+          <a:p>
+            <a:endParaRPr lang="en-US" dirty="0"/>
+          </a:p>
+          <a:p>
+            <a:r>
+              <a:rPr lang="en-US" dirty="0" smtClean="0"/>
+              <a:t>Space Complexity </a:t>
+            </a:r>
+          </a:p>
+          <a:p>
+            <a:pPr lvl="1"/>
+            <a:r>
+              <a:rPr lang="en-US" dirty="0" smtClean="0"/>
+              <a:t>O(n) where n is length of solution path</a:t>
+            </a:r>
+          </a:p>
+          <a:p>
+            <a:pPr lvl="1"/>
+            <a:r>
+              <a:rPr lang="en-US" dirty="0" smtClean="0"/>
+              <a:t>Absolute worst case: O(|V|)</a:t>
+            </a:r>
+          </a:p>
+          <a:p>
+            <a:endParaRPr lang="en-US" dirty="0"/>
+          </a:p>
+          <a:p>
+            <a:r>
+              <a:rPr lang="en-US" dirty="0" smtClean="0"/>
+              <a:t>Time Complexity </a:t>
+            </a:r>
+          </a:p>
+          <a:p>
+            <a:pPr lvl="1"/>
+            <a:r>
+              <a:rPr lang="en-US" dirty="0" smtClean="0"/>
+              <a:t>O(n)</a:t>
+            </a:r>
+            <a:r>
+              <a:rPr lang="en-US" dirty="0"/>
+              <a:t> where n is length of solution </a:t>
+            </a:r>
+            <a:r>
+              <a:rPr lang="en-US" dirty="0" smtClean="0"/>
+              <a:t>path</a:t>
+            </a:r>
+          </a:p>
+          <a:p>
+            <a:pPr lvl="1"/>
+            <a:r>
+              <a:rPr lang="en-US" dirty="0" smtClean="0"/>
+              <a:t>Absolute worst case: O(|V|)</a:t>
+            </a:r>
+            <a:endParaRPr lang="en-US" dirty="0"/>
+          </a:p>
+        </p:txBody>
+      </p:sp>
+    </p:spTree>
+    <p:extLst>
+      <p:ext uri="{BB962C8B-B14F-4D97-AF65-F5344CB8AC3E}">
+        <p14:creationId xmlns:p14="http://schemas.microsoft.com/office/powerpoint/2010/main" val="1525539646"/>
+      </p:ext>
+    </p:extLst>
+  </p:cSld>
+  <p:clrMapOvr>
+    <a:masterClrMapping/>
+  </p:clrMapOvr>
+  <p:timing>
+    <p:tnLst>
+      <p:par>
+        <p:cTn id="1" dur="indefinite" restart="never" nodeType="tmRoot"/>
+      </p:par>
+    </p:tnLst>
+  </p:timing>
+</p:sld>
+</file>
+
+<file path=ppt/slides/slide7.xml><?xml version="1.0" encoding="utf-8"?>
+<p:sld xmlns:a="http://schemas.openxmlformats.org/drawingml/2006/main" xmlns:r="http://schemas.openxmlformats.org/officeDocument/2006/relationships" xmlns:p="http://schemas.openxmlformats.org/presentationml/2006/main">
+  <p:cSld>
+    <p:spTree>
+      <p:nvGrpSpPr>
+        <p:cNvPr id="1" name=""/>
+        <p:cNvGrpSpPr/>
+        <p:nvPr/>
+      </p:nvGrpSpPr>
+      <p:grpSpPr>
+        <a:xfrm>
+          <a:off x="0" y="0"/>
+          <a:ext cx="0" cy="0"/>
+          <a:chOff x="0" y="0"/>
+          <a:chExt cx="0" cy="0"/>
+        </a:xfrm>
+      </p:grpSpPr>
+      <p:sp>
+        <p:nvSpPr>
+          <p:cNvPr id="2" name="Title 1"/>
+          <p:cNvSpPr>
+            <a:spLocks noGrp="1"/>
+          </p:cNvSpPr>
+          <p:nvPr>
+            <p:ph type="title"/>
+          </p:nvPr>
+        </p:nvSpPr>
+        <p:spPr/>
+        <p:txBody>
+          <a:bodyPr/>
+          <a:lstStyle/>
+          <a:p>
+            <a:r>
+              <a:rPr lang="en-US" dirty="0" smtClean="0"/>
+              <a:t>A* Developed in 1968</a:t>
+            </a:r>
+            <a:endParaRPr lang="en-US" dirty="0"/>
+          </a:p>
+        </p:txBody>
+      </p:sp>
+      <p:sp>
+        <p:nvSpPr>
+          <p:cNvPr id="3" name="Content Placeholder 2"/>
+          <p:cNvSpPr>
+            <a:spLocks noGrp="1"/>
+          </p:cNvSpPr>
+          <p:nvPr>
+            <p:ph idx="1"/>
+          </p:nvPr>
+        </p:nvSpPr>
+        <p:spPr/>
+        <p:txBody>
+          <a:bodyPr/>
+          <a:lstStyle/>
+          <a:p>
+            <a:r>
+              <a:rPr lang="en-US" dirty="0" smtClean="0"/>
+              <a:t>To improve path planning done by </a:t>
+            </a:r>
+            <a:r>
+              <a:rPr lang="en-US" dirty="0" err="1" smtClean="0"/>
+              <a:t>Shakey</a:t>
+            </a:r>
+            <a:r>
+              <a:rPr lang="en-US" dirty="0" smtClean="0"/>
+              <a:t> the Robot</a:t>
+            </a:r>
+          </a:p>
+          <a:p>
+            <a:endParaRPr lang="en-US" dirty="0"/>
+          </a:p>
+          <a:p>
+            <a:r>
+              <a:rPr lang="en-US" dirty="0" smtClean="0"/>
+              <a:t>To develop faster alternative to Dijkstra’s Algorithm</a:t>
+            </a:r>
+          </a:p>
+          <a:p>
+            <a:endParaRPr lang="en-US" dirty="0"/>
+          </a:p>
+          <a:p>
+            <a:r>
+              <a:rPr lang="en-US" dirty="0" smtClean="0"/>
+              <a:t>Find heuristic that was optimal under certain conditions</a:t>
+            </a:r>
+          </a:p>
+          <a:p>
+            <a:endParaRPr lang="en-US" dirty="0"/>
+          </a:p>
+          <a:p>
+            <a:r>
+              <a:rPr lang="en-US" dirty="0" smtClean="0"/>
+              <a:t>Uses what “appears” to be shortest path to increase speed</a:t>
+            </a:r>
+            <a:endParaRPr lang="en-US" dirty="0"/>
+          </a:p>
+        </p:txBody>
+      </p:sp>
+    </p:spTree>
+    <p:extLst>
+      <p:ext uri="{BB962C8B-B14F-4D97-AF65-F5344CB8AC3E}">
+        <p14:creationId xmlns:p14="http://schemas.microsoft.com/office/powerpoint/2010/main" val="2731621611"/>
+      </p:ext>
+    </p:extLst>
+  </p:cSld>
+  <p:clrMapOvr>
+    <a:masterClrMapping/>
+  </p:clrMapOvr>
+  <p:timing>
+    <p:tnLst>
+      <p:par>
+        <p:cTn id="1" dur="indefinite" restart="never" nodeType="tmRoot"/>
+      </p:par>
+    </p:tnLst>
+  </p:timing>
+</p:sld>
+</file>
+
+<file path=ppt/slides/slide8.xml><?xml version="1.0" encoding="utf-8"?>
+<p:sld xmlns:a="http://schemas.openxmlformats.org/drawingml/2006/main" xmlns:r="http://schemas.openxmlformats.org/officeDocument/2006/relationships" xmlns:p="http://schemas.openxmlformats.org/presentationml/2006/main">
+  <p:cSld>
+    <p:spTree>
+      <p:nvGrpSpPr>
+        <p:cNvPr id="1" name=""/>
+        <p:cNvGrpSpPr/>
+        <p:nvPr/>
+      </p:nvGrpSpPr>
+      <p:grpSpPr>
+        <a:xfrm>
+          <a:off x="0" y="0"/>
+          <a:ext cx="0" cy="0"/>
+          <a:chOff x="0" y="0"/>
+          <a:chExt cx="0" cy="0"/>
+        </a:xfrm>
+      </p:grpSpPr>
+      <p:sp>
+        <p:nvSpPr>
+          <p:cNvPr id="2" name="Title 1"/>
+          <p:cNvSpPr>
+            <a:spLocks noGrp="1"/>
+          </p:cNvSpPr>
+          <p:nvPr>
+            <p:ph type="title"/>
+          </p:nvPr>
+        </p:nvSpPr>
+        <p:spPr/>
+        <p:txBody>
+          <a:bodyPr/>
+          <a:lstStyle/>
+          <a:p>
+            <a:r>
+              <a:rPr lang="en-US" dirty="0" smtClean="0"/>
+              <a:t>Dijkstra vs A*</a:t>
+            </a:r>
+            <a:endParaRPr lang="en-US" dirty="0"/>
+          </a:p>
+        </p:txBody>
+      </p:sp>
+      <p:sp>
+        <p:nvSpPr>
+          <p:cNvPr id="3" name="Content Placeholder 2"/>
+          <p:cNvSpPr>
+            <a:spLocks noGrp="1"/>
+          </p:cNvSpPr>
+          <p:nvPr>
+            <p:ph idx="1"/>
+          </p:nvPr>
+        </p:nvSpPr>
+        <p:spPr/>
+        <p:txBody>
+          <a:bodyPr/>
+          <a:lstStyle/>
+          <a:p>
+            <a:r>
+              <a:rPr lang="en-US" dirty="0" smtClean="0"/>
+              <a:t>Difference only in how candidates are weighed</a:t>
+            </a:r>
+          </a:p>
+          <a:p>
+            <a:endParaRPr lang="en-US" dirty="0"/>
+          </a:p>
+          <a:p>
+            <a:r>
+              <a:rPr lang="en-US" dirty="0" smtClean="0"/>
+              <a:t>Dijkstra</a:t>
+            </a:r>
+          </a:p>
+          <a:p>
+            <a:pPr lvl="1"/>
+            <a:r>
+              <a:rPr lang="en-US" dirty="0" smtClean="0"/>
+              <a:t>Cost of edge + cost of </a:t>
+            </a:r>
+            <a:r>
+              <a:rPr lang="en-US" dirty="0" smtClean="0"/>
+              <a:t>the path so far</a:t>
+            </a:r>
+            <a:r>
+              <a:rPr lang="en-US" dirty="0" smtClean="0"/>
+              <a:t> = </a:t>
+            </a:r>
+            <a:r>
+              <a:rPr lang="en-US" dirty="0" smtClean="0"/>
+              <a:t>length of current path</a:t>
+            </a:r>
+          </a:p>
+          <a:p>
+            <a:pPr lvl="1"/>
+            <a:endParaRPr lang="en-US" dirty="0"/>
+          </a:p>
+          <a:p>
+            <a:r>
+              <a:rPr lang="en-US" dirty="0"/>
+              <a:t>A</a:t>
+            </a:r>
+            <a:r>
+              <a:rPr lang="en-US" dirty="0" smtClean="0"/>
+              <a:t>*</a:t>
+            </a:r>
+          </a:p>
+          <a:p>
+            <a:pPr lvl="1"/>
+            <a:r>
+              <a:rPr lang="en-US" dirty="0" smtClean="0"/>
+              <a:t>Cost of edge + </a:t>
+            </a:r>
+            <a:r>
+              <a:rPr lang="en-US" dirty="0"/>
+              <a:t>cost of the path so far + </a:t>
+            </a:r>
+            <a:r>
+              <a:rPr lang="en-US" dirty="0" smtClean="0"/>
+              <a:t>Estimated cost to reach target</a:t>
+            </a:r>
+          </a:p>
+        </p:txBody>
+      </p:sp>
+    </p:spTree>
+    <p:extLst>
+      <p:ext uri="{BB962C8B-B14F-4D97-AF65-F5344CB8AC3E}">
+        <p14:creationId xmlns:p14="http://schemas.microsoft.com/office/powerpoint/2010/main" val="1356365731"/>
+      </p:ext>
+    </p:extLst>
+  </p:cSld>
+  <p:clrMapOvr>
+    <a:masterClrMapping/>
+  </p:clrMapOvr>
+  <p:timing>
+    <p:tnLst>
+      <p:par>
+        <p:cTn id="1" dur="indefinite" restart="never" nodeType="tmRoot"/>
+      </p:par>
+    </p:tnLst>
+  </p:timing>
+</p:sld>
+</file>
+
+<file path=ppt/slides/slide9.xml><?xml version="1.0" encoding="utf-8"?>
+<p:sld xmlns:a="http://schemas.openxmlformats.org/drawingml/2006/main" xmlns:r="http://schemas.openxmlformats.org/officeDocument/2006/relationships" xmlns:p="http://schemas.openxmlformats.org/presentationml/2006/main">
+  <p:cSld>
+    <p:spTree>
+      <p:nvGrpSpPr>
+        <p:cNvPr id="1" name=""/>
+        <p:cNvGrpSpPr/>
+        <p:nvPr/>
+      </p:nvGrpSpPr>
+      <p:grpSpPr>
+        <a:xfrm>
+          <a:off x="0" y="0"/>
+          <a:ext cx="0" cy="0"/>
+          <a:chOff x="0" y="0"/>
+          <a:chExt cx="0" cy="0"/>
+        </a:xfrm>
+      </p:grpSpPr>
+      <p:sp>
+        <p:nvSpPr>
+          <p:cNvPr id="2" name="Title 1"/>
+          <p:cNvSpPr>
+            <a:spLocks noGrp="1"/>
+          </p:cNvSpPr>
+          <p:nvPr>
+            <p:ph type="title"/>
+          </p:nvPr>
+        </p:nvSpPr>
+        <p:spPr/>
+        <p:txBody>
+          <a:bodyPr/>
+          <a:lstStyle/>
+          <a:p>
+            <a:r>
+              <a:rPr lang="en-US" dirty="0"/>
+              <a:t>Dijkstra vs A*</a:t>
+            </a:r>
+          </a:p>
+        </p:txBody>
+      </p:sp>
+      <p:sp>
+        <p:nvSpPr>
+          <p:cNvPr id="3" name="Content Placeholder 2"/>
+          <p:cNvSpPr>
+            <a:spLocks noGrp="1"/>
+          </p:cNvSpPr>
+          <p:nvPr>
+            <p:ph idx="1"/>
+          </p:nvPr>
+        </p:nvSpPr>
+        <p:spPr/>
+        <p:txBody>
+          <a:bodyPr/>
+          <a:lstStyle/>
+          <a:p>
+            <a:r>
+              <a:rPr lang="en-US" dirty="0" smtClean="0"/>
+              <a:t>Dijkstra’s Algorithm is actually a special case for A*</a:t>
+            </a:r>
+          </a:p>
+          <a:p>
+            <a:pPr lvl="1"/>
+            <a:r>
+              <a:rPr lang="en-US" dirty="0" smtClean="0"/>
+              <a:t>Estimated cost to each node is 0</a:t>
+            </a:r>
+            <a:endParaRPr lang="en-US" dirty="0"/>
+          </a:p>
+          <a:p>
+            <a:pPr lvl="1"/>
+            <a:endParaRPr lang="en-US" dirty="0" smtClean="0"/>
+          </a:p>
+          <a:p>
+            <a:r>
+              <a:rPr lang="en-US" dirty="0" smtClean="0"/>
+              <a:t>Estimation might seem counter intuitive</a:t>
+            </a:r>
+          </a:p>
+          <a:p>
+            <a:pPr lvl="1"/>
+            <a:r>
+              <a:rPr lang="en-US" dirty="0" smtClean="0"/>
+              <a:t>Exists only where it can</a:t>
+            </a:r>
+          </a:p>
+          <a:p>
+            <a:pPr lvl="1"/>
+            <a:r>
+              <a:rPr lang="en-US" dirty="0" smtClean="0"/>
+              <a:t>If estimation can’t occur, A* acts exactly like Dijkstra’s Algorithm</a:t>
+            </a:r>
+            <a:endParaRPr lang="en-US" dirty="0"/>
+          </a:p>
+        </p:txBody>
+      </p:sp>
+    </p:spTree>
+    <p:extLst>
+      <p:ext uri="{BB962C8B-B14F-4D97-AF65-F5344CB8AC3E}">
+        <p14:creationId xmlns:p14="http://schemas.microsoft.com/office/powerpoint/2010/main" val="1247739280"/>
+      </p:ext>
+    </p:extLst>
+  </p:cSld>
+  <p:clrMapOvr>
+    <a:masterClrMapping/>
+  </p:clrMapOvr>
+  <p:timing>
+    <p:tnLst>
+      <p:par>
+        <p:cTn id="1" dur="indefinite" restart="never" nodeType="tmRoot"/>
+      </p:par>
+    </p:tnLst>
+  </p:timing>
 </p:sld>
 </file>
 

</xml_diff>

<commit_message>
Saved with spacing update
</commit_message>
<xml_diff>
--- a/Documents/GraphTheoryPresentation.pptx
+++ b/Documents/GraphTheoryPresentation.pptx
@@ -310,7 +310,7 @@
           <a:p>
             <a:fld id="{3193134D-0F55-4C59-9C29-9CE94E03BA7C}" type="datetimeFigureOut">
               <a:rPr lang="en-US" smtClean="0"/>
-              <a:t>4/30/2016</a:t>
+              <a:t>5/1/2016</a:t>
             </a:fld>
             <a:endParaRPr lang="en-US"/>
           </a:p>
@@ -585,7 +585,7 @@
           <a:p>
             <a:fld id="{3193134D-0F55-4C59-9C29-9CE94E03BA7C}" type="datetimeFigureOut">
               <a:rPr lang="en-US" smtClean="0"/>
-              <a:t>4/30/2016</a:t>
+              <a:t>5/1/2016</a:t>
             </a:fld>
             <a:endParaRPr lang="en-US"/>
           </a:p>
@@ -779,7 +779,7 @@
           <a:p>
             <a:fld id="{3193134D-0F55-4C59-9C29-9CE94E03BA7C}" type="datetimeFigureOut">
               <a:rPr lang="en-US" smtClean="0"/>
-              <a:t>4/30/2016</a:t>
+              <a:t>5/1/2016</a:t>
             </a:fld>
             <a:endParaRPr lang="en-US"/>
           </a:p>
@@ -1047,7 +1047,7 @@
           <a:p>
             <a:fld id="{3193134D-0F55-4C59-9C29-9CE94E03BA7C}" type="datetimeFigureOut">
               <a:rPr lang="en-US" smtClean="0"/>
-              <a:t>4/30/2016</a:t>
+              <a:t>5/1/2016</a:t>
             </a:fld>
             <a:endParaRPr lang="en-US"/>
           </a:p>
@@ -1379,7 +1379,7 @@
           <a:p>
             <a:fld id="{3193134D-0F55-4C59-9C29-9CE94E03BA7C}" type="datetimeFigureOut">
               <a:rPr lang="en-US" smtClean="0"/>
-              <a:t>4/30/2016</a:t>
+              <a:t>5/1/2016</a:t>
             </a:fld>
             <a:endParaRPr lang="en-US"/>
           </a:p>
@@ -1989,7 +1989,7 @@
           <a:p>
             <a:fld id="{3193134D-0F55-4C59-9C29-9CE94E03BA7C}" type="datetimeFigureOut">
               <a:rPr lang="en-US" smtClean="0"/>
-              <a:t>4/30/2016</a:t>
+              <a:t>5/1/2016</a:t>
             </a:fld>
             <a:endParaRPr lang="en-US"/>
           </a:p>
@@ -2836,7 +2836,7 @@
           <a:p>
             <a:fld id="{3193134D-0F55-4C59-9C29-9CE94E03BA7C}" type="datetimeFigureOut">
               <a:rPr lang="en-US" smtClean="0"/>
-              <a:t>4/30/2016</a:t>
+              <a:t>5/1/2016</a:t>
             </a:fld>
             <a:endParaRPr lang="en-US"/>
           </a:p>
@@ -3006,7 +3006,7 @@
           <a:p>
             <a:fld id="{3193134D-0F55-4C59-9C29-9CE94E03BA7C}" type="datetimeFigureOut">
               <a:rPr lang="en-US" smtClean="0"/>
-              <a:t>4/30/2016</a:t>
+              <a:t>5/1/2016</a:t>
             </a:fld>
             <a:endParaRPr lang="en-US"/>
           </a:p>
@@ -3186,7 +3186,7 @@
           <a:p>
             <a:fld id="{3193134D-0F55-4C59-9C29-9CE94E03BA7C}" type="datetimeFigureOut">
               <a:rPr lang="en-US" smtClean="0"/>
-              <a:t>4/30/2016</a:t>
+              <a:t>5/1/2016</a:t>
             </a:fld>
             <a:endParaRPr lang="en-US"/>
           </a:p>
@@ -3356,7 +3356,7 @@
           <a:p>
             <a:fld id="{3193134D-0F55-4C59-9C29-9CE94E03BA7C}" type="datetimeFigureOut">
               <a:rPr lang="en-US" smtClean="0"/>
-              <a:t>4/30/2016</a:t>
+              <a:t>5/1/2016</a:t>
             </a:fld>
             <a:endParaRPr lang="en-US"/>
           </a:p>
@@ -3600,7 +3600,7 @@
           <a:p>
             <a:fld id="{3193134D-0F55-4C59-9C29-9CE94E03BA7C}" type="datetimeFigureOut">
               <a:rPr lang="en-US" smtClean="0"/>
-              <a:t>4/30/2016</a:t>
+              <a:t>5/1/2016</a:t>
             </a:fld>
             <a:endParaRPr lang="en-US"/>
           </a:p>
@@ -3892,7 +3892,7 @@
           <a:p>
             <a:fld id="{3193134D-0F55-4C59-9C29-9CE94E03BA7C}" type="datetimeFigureOut">
               <a:rPr lang="en-US" smtClean="0"/>
-              <a:t>4/30/2016</a:t>
+              <a:t>5/1/2016</a:t>
             </a:fld>
             <a:endParaRPr lang="en-US"/>
           </a:p>
@@ -4330,7 +4330,7 @@
           <a:p>
             <a:fld id="{3193134D-0F55-4C59-9C29-9CE94E03BA7C}" type="datetimeFigureOut">
               <a:rPr lang="en-US" smtClean="0"/>
-              <a:t>4/30/2016</a:t>
+              <a:t>5/1/2016</a:t>
             </a:fld>
             <a:endParaRPr lang="en-US"/>
           </a:p>
@@ -4448,7 +4448,7 @@
           <a:p>
             <a:fld id="{3193134D-0F55-4C59-9C29-9CE94E03BA7C}" type="datetimeFigureOut">
               <a:rPr lang="en-US" smtClean="0"/>
-              <a:t>4/30/2016</a:t>
+              <a:t>5/1/2016</a:t>
             </a:fld>
             <a:endParaRPr lang="en-US"/>
           </a:p>
@@ -4543,7 +4543,7 @@
           <a:p>
             <a:fld id="{3193134D-0F55-4C59-9C29-9CE94E03BA7C}" type="datetimeFigureOut">
               <a:rPr lang="en-US" smtClean="0"/>
-              <a:t>4/30/2016</a:t>
+              <a:t>5/1/2016</a:t>
             </a:fld>
             <a:endParaRPr lang="en-US"/>
           </a:p>
@@ -4822,7 +4822,7 @@
           <a:p>
             <a:fld id="{3193134D-0F55-4C59-9C29-9CE94E03BA7C}" type="datetimeFigureOut">
               <a:rPr lang="en-US" smtClean="0"/>
-              <a:t>4/30/2016</a:t>
+              <a:t>5/1/2016</a:t>
             </a:fld>
             <a:endParaRPr lang="en-US"/>
           </a:p>
@@ -5097,7 +5097,7 @@
           <a:p>
             <a:fld id="{3193134D-0F55-4C59-9C29-9CE94E03BA7C}" type="datetimeFigureOut">
               <a:rPr lang="en-US" smtClean="0"/>
-              <a:t>4/30/2016</a:t>
+              <a:t>5/1/2016</a:t>
             </a:fld>
             <a:endParaRPr lang="en-US"/>
           </a:p>
@@ -5526,7 +5526,7 @@
           <a:p>
             <a:fld id="{3193134D-0F55-4C59-9C29-9CE94E03BA7C}" type="datetimeFigureOut">
               <a:rPr lang="en-US" smtClean="0"/>
-              <a:t>4/30/2016</a:t>
+              <a:t>5/1/2016</a:t>
             </a:fld>
             <a:endParaRPr lang="en-US"/>
           </a:p>
@@ -7124,10 +7124,18 @@
           </a:p>
           <a:p>
             <a:r>
-              <a:rPr lang="en-US"/>
-              <a:t>https://www.youtube.com/watch?v=DlkMs4ZHHr8</a:t>
-            </a:r>
-            <a:endParaRPr lang="en-US" dirty="0"/>
+              <a:rPr lang="en-US" dirty="0">
+                <a:hlinkClick r:id="rId2"/>
+              </a:rPr>
+              <a:t>https://</a:t>
+            </a:r>
+            <a:r>
+              <a:rPr lang="en-US" dirty="0" smtClean="0">
+                <a:hlinkClick r:id="rId2"/>
+              </a:rPr>
+              <a:t>www.youtube.com/watch?v=DlkMs4ZHHr8</a:t>
+            </a:r>
+            <a:endParaRPr lang="en-US" dirty="0" smtClean="0"/>
           </a:p>
         </p:txBody>
       </p:sp>
@@ -7567,7 +7575,6 @@
               <a:rPr lang="en-US" dirty="0" smtClean="0"/>
               <a:t>Every node was visited and all possible paths recorded</a:t>
             </a:r>
-            <a:endParaRPr lang="en-US" dirty="0" smtClean="0"/>
           </a:p>
           <a:p>
             <a:pPr lvl="1"/>
@@ -8153,19 +8160,7 @@
             <a:pPr lvl="1"/>
             <a:r>
               <a:rPr lang="en-US" dirty="0" smtClean="0"/>
-              <a:t>Cost of edge + cost of </a:t>
-            </a:r>
-            <a:r>
-              <a:rPr lang="en-US" dirty="0" smtClean="0"/>
-              <a:t>the path so far</a:t>
-            </a:r>
-            <a:r>
-              <a:rPr lang="en-US" dirty="0" smtClean="0"/>
-              <a:t> = </a:t>
-            </a:r>
-            <a:r>
-              <a:rPr lang="en-US" dirty="0" smtClean="0"/>
-              <a:t>length of current path</a:t>
+              <a:t>Cost of edge + cost of the path so far = length of current path</a:t>
             </a:r>
           </a:p>
           <a:p>

</xml_diff>